<commit_message>
Adding slides to pitch deck
</commit_message>
<xml_diff>
--- a/Documentation/Company/Business Plan/Pitch Deck.pptx
+++ b/Documentation/Company/Business Plan/Pitch Deck.pptx
@@ -7,6 +7,11 @@
   <p:sldIdLst>
     <p:sldId id="257" r:id="rId2"/>
     <p:sldId id="258" r:id="rId3"/>
+    <p:sldId id="259" r:id="rId4"/>
+    <p:sldId id="260" r:id="rId5"/>
+    <p:sldId id="261" r:id="rId6"/>
+    <p:sldId id="262" r:id="rId7"/>
+    <p:sldId id="263" r:id="rId8"/>
   </p:sldIdLst>
   <p:sldSz cx="12192000" cy="6858000"/>
   <p:notesSz cx="6858000" cy="9144000"/>
@@ -105,6 +110,11 @@
       </a:defRPr>
     </a:lvl9pPr>
   </p:defaultTextStyle>
+  <p:extLst>
+    <p:ext uri="{EFAFB233-063F-42B5-8137-9DF3F51BA10A}">
+      <p15:sldGuideLst xmlns:p15="http://schemas.microsoft.com/office/powerpoint/2012/main"/>
+    </p:ext>
+  </p:extLst>
 </p:presentation>
 </file>
 
@@ -239,7 +249,7 @@
           <a:p>
             <a:fld id="{2C8E488F-17E1-4987-9B84-52182549A8DE}" type="datetimeFigureOut">
               <a:rPr lang="en-US" smtClean="0"/>
-              <a:t>2/7/2017</a:t>
+              <a:t>2/9/2017</a:t>
             </a:fld>
             <a:endParaRPr lang="en-US"/>
           </a:p>
@@ -409,7 +419,7 @@
           <a:p>
             <a:fld id="{2C8E488F-17E1-4987-9B84-52182549A8DE}" type="datetimeFigureOut">
               <a:rPr lang="en-US" smtClean="0"/>
-              <a:t>2/7/2017</a:t>
+              <a:t>2/9/2017</a:t>
             </a:fld>
             <a:endParaRPr lang="en-US"/>
           </a:p>
@@ -589,7 +599,7 @@
           <a:p>
             <a:fld id="{2C8E488F-17E1-4987-9B84-52182549A8DE}" type="datetimeFigureOut">
               <a:rPr lang="en-US" smtClean="0"/>
-              <a:t>2/7/2017</a:t>
+              <a:t>2/9/2017</a:t>
             </a:fld>
             <a:endParaRPr lang="en-US"/>
           </a:p>
@@ -759,7 +769,7 @@
           <a:p>
             <a:fld id="{2C8E488F-17E1-4987-9B84-52182549A8DE}" type="datetimeFigureOut">
               <a:rPr lang="en-US" smtClean="0"/>
-              <a:t>2/7/2017</a:t>
+              <a:t>2/9/2017</a:t>
             </a:fld>
             <a:endParaRPr lang="en-US"/>
           </a:p>
@@ -1005,7 +1015,7 @@
           <a:p>
             <a:fld id="{2C8E488F-17E1-4987-9B84-52182549A8DE}" type="datetimeFigureOut">
               <a:rPr lang="en-US" smtClean="0"/>
-              <a:t>2/7/2017</a:t>
+              <a:t>2/9/2017</a:t>
             </a:fld>
             <a:endParaRPr lang="en-US"/>
           </a:p>
@@ -1237,7 +1247,7 @@
           <a:p>
             <a:fld id="{2C8E488F-17E1-4987-9B84-52182549A8DE}" type="datetimeFigureOut">
               <a:rPr lang="en-US" smtClean="0"/>
-              <a:t>2/7/2017</a:t>
+              <a:t>2/9/2017</a:t>
             </a:fld>
             <a:endParaRPr lang="en-US"/>
           </a:p>
@@ -1604,7 +1614,7 @@
           <a:p>
             <a:fld id="{2C8E488F-17E1-4987-9B84-52182549A8DE}" type="datetimeFigureOut">
               <a:rPr lang="en-US" smtClean="0"/>
-              <a:t>2/7/2017</a:t>
+              <a:t>2/9/2017</a:t>
             </a:fld>
             <a:endParaRPr lang="en-US"/>
           </a:p>
@@ -1722,7 +1732,7 @@
           <a:p>
             <a:fld id="{2C8E488F-17E1-4987-9B84-52182549A8DE}" type="datetimeFigureOut">
               <a:rPr lang="en-US" smtClean="0"/>
-              <a:t>2/7/2017</a:t>
+              <a:t>2/9/2017</a:t>
             </a:fld>
             <a:endParaRPr lang="en-US"/>
           </a:p>
@@ -1817,7 +1827,7 @@
           <a:p>
             <a:fld id="{2C8E488F-17E1-4987-9B84-52182549A8DE}" type="datetimeFigureOut">
               <a:rPr lang="en-US" smtClean="0"/>
-              <a:t>2/7/2017</a:t>
+              <a:t>2/9/2017</a:t>
             </a:fld>
             <a:endParaRPr lang="en-US"/>
           </a:p>
@@ -2094,7 +2104,7 @@
           <a:p>
             <a:fld id="{2C8E488F-17E1-4987-9B84-52182549A8DE}" type="datetimeFigureOut">
               <a:rPr lang="en-US" smtClean="0"/>
-              <a:t>2/7/2017</a:t>
+              <a:t>2/9/2017</a:t>
             </a:fld>
             <a:endParaRPr lang="en-US"/>
           </a:p>
@@ -2347,7 +2357,7 @@
           <a:p>
             <a:fld id="{2C8E488F-17E1-4987-9B84-52182549A8DE}" type="datetimeFigureOut">
               <a:rPr lang="en-US" smtClean="0"/>
-              <a:t>2/7/2017</a:t>
+              <a:t>2/9/2017</a:t>
             </a:fld>
             <a:endParaRPr lang="en-US"/>
           </a:p>
@@ -2560,7 +2570,7 @@
           <a:p>
             <a:fld id="{2C8E488F-17E1-4987-9B84-52182549A8DE}" type="datetimeFigureOut">
               <a:rPr lang="en-US" smtClean="0"/>
-              <a:t>2/7/2017</a:t>
+              <a:t>2/9/2017</a:t>
             </a:fld>
             <a:endParaRPr lang="en-US"/>
           </a:p>
@@ -2998,192 +3008,6 @@
           </a:fontRef>
         </p:style>
       </p:cxnSp>
-      <p:sp>
-        <p:nvSpPr>
-          <p:cNvPr id="4" name="TextBox 3"/>
-          <p:cNvSpPr txBox="1"/>
-          <p:nvPr/>
-        </p:nvSpPr>
-        <p:spPr>
-          <a:xfrm>
-            <a:off x="1303058" y="1293434"/>
-            <a:ext cx="5464366" cy="584775"/>
-          </a:xfrm>
-          <a:prstGeom prst="rect">
-            <a:avLst/>
-          </a:prstGeom>
-          <a:noFill/>
-        </p:spPr>
-        <p:txBody>
-          <a:bodyPr wrap="square" rtlCol="0">
-            <a:spAutoFit/>
-          </a:bodyPr>
-          <a:lstStyle/>
-          <a:p>
-            <a:r>
-              <a:rPr lang="en-US" sz="3200" dirty="0" smtClean="0"/>
-              <a:t>Methodocracy Foundation</a:t>
-            </a:r>
-            <a:endParaRPr lang="en-US" sz="3200" dirty="0"/>
-          </a:p>
-        </p:txBody>
-      </p:sp>
-      <p:sp>
-        <p:nvSpPr>
-          <p:cNvPr id="5" name="TextBox 4"/>
-          <p:cNvSpPr txBox="1"/>
-          <p:nvPr/>
-        </p:nvSpPr>
-        <p:spPr>
-          <a:xfrm>
-            <a:off x="3208975" y="3112180"/>
-            <a:ext cx="1013552" cy="461665"/>
-          </a:xfrm>
-          <a:prstGeom prst="rect">
-            <a:avLst/>
-          </a:prstGeom>
-          <a:solidFill>
-            <a:schemeClr val="bg1"/>
-          </a:solidFill>
-        </p:spPr>
-        <p:txBody>
-          <a:bodyPr wrap="square" rtlCol="0">
-            <a:spAutoFit/>
-          </a:bodyPr>
-          <a:lstStyle/>
-          <a:p>
-            <a:r>
-              <a:rPr lang="en-US" sz="2400" dirty="0" smtClean="0"/>
-              <a:t>Makes</a:t>
-            </a:r>
-            <a:endParaRPr lang="en-US" sz="2400" dirty="0"/>
-          </a:p>
-        </p:txBody>
-      </p:sp>
-      <p:sp>
-        <p:nvSpPr>
-          <p:cNvPr id="6" name="TextBox 5"/>
-          <p:cNvSpPr txBox="1"/>
-          <p:nvPr/>
-        </p:nvSpPr>
-        <p:spPr>
-          <a:xfrm>
-            <a:off x="2041188" y="4807816"/>
-            <a:ext cx="4362679" cy="584775"/>
-          </a:xfrm>
-          <a:prstGeom prst="rect">
-            <a:avLst/>
-          </a:prstGeom>
-          <a:noFill/>
-        </p:spPr>
-        <p:txBody>
-          <a:bodyPr wrap="square" rtlCol="0">
-            <a:spAutoFit/>
-          </a:bodyPr>
-          <a:lstStyle/>
-          <a:p>
-            <a:r>
-              <a:rPr lang="en-US" sz="3200" dirty="0"/>
-              <a:t>m</a:t>
-            </a:r>
-            <a:r>
-              <a:rPr lang="en-US" sz="3200" dirty="0" smtClean="0"/>
-              <a:t>ethodocracy.org</a:t>
-            </a:r>
-            <a:endParaRPr lang="en-US" sz="3200" dirty="0"/>
-          </a:p>
-        </p:txBody>
-      </p:sp>
-      <p:sp>
-        <p:nvSpPr>
-          <p:cNvPr id="9" name="TextBox 8"/>
-          <p:cNvSpPr txBox="1"/>
-          <p:nvPr/>
-        </p:nvSpPr>
-        <p:spPr>
-          <a:xfrm>
-            <a:off x="9347246" y="2020548"/>
-            <a:ext cx="2612811" cy="400110"/>
-          </a:xfrm>
-          <a:prstGeom prst="rect">
-            <a:avLst/>
-          </a:prstGeom>
-          <a:noFill/>
-        </p:spPr>
-        <p:txBody>
-          <a:bodyPr wrap="square" rtlCol="0">
-            <a:spAutoFit/>
-          </a:bodyPr>
-          <a:lstStyle/>
-          <a:p>
-            <a:r>
-              <a:rPr lang="en-US" sz="2000" dirty="0" smtClean="0"/>
-              <a:t>Scientific</a:t>
-            </a:r>
-            <a:endParaRPr lang="en-US" sz="2000" dirty="0"/>
-          </a:p>
-        </p:txBody>
-      </p:sp>
-      <p:sp>
-        <p:nvSpPr>
-          <p:cNvPr id="10" name="TextBox 9"/>
-          <p:cNvSpPr txBox="1"/>
-          <p:nvPr/>
-        </p:nvSpPr>
-        <p:spPr>
-          <a:xfrm>
-            <a:off x="9221303" y="4407706"/>
-            <a:ext cx="1931594" cy="400110"/>
-          </a:xfrm>
-          <a:prstGeom prst="rect">
-            <a:avLst/>
-          </a:prstGeom>
-          <a:noFill/>
-        </p:spPr>
-        <p:txBody>
-          <a:bodyPr wrap="square" rtlCol="0">
-            <a:spAutoFit/>
-          </a:bodyPr>
-          <a:lstStyle/>
-          <a:p>
-            <a:r>
-              <a:rPr lang="en-US" sz="2000" dirty="0" smtClean="0"/>
-              <a:t>Educational</a:t>
-            </a:r>
-            <a:endParaRPr lang="en-US" sz="2000" dirty="0"/>
-          </a:p>
-        </p:txBody>
-      </p:sp>
-      <p:sp>
-        <p:nvSpPr>
-          <p:cNvPr id="11" name="TextBox 10"/>
-          <p:cNvSpPr txBox="1"/>
-          <p:nvPr/>
-        </p:nvSpPr>
-        <p:spPr>
-          <a:xfrm>
-            <a:off x="6168051" y="3050625"/>
-            <a:ext cx="4019049" cy="584775"/>
-          </a:xfrm>
-          <a:prstGeom prst="rect">
-            <a:avLst/>
-          </a:prstGeom>
-          <a:noFill/>
-        </p:spPr>
-        <p:txBody>
-          <a:bodyPr wrap="none" rtlCol="0">
-            <a:spAutoFit/>
-          </a:bodyPr>
-          <a:lstStyle/>
-          <a:p>
-            <a:r>
-              <a:rPr lang="en-US" sz="3200" dirty="0" smtClean="0"/>
-              <a:t>Nonprofit Organization</a:t>
-            </a:r>
-            <a:endParaRPr lang="en-US" sz="3200" dirty="0"/>
-          </a:p>
-        </p:txBody>
-      </p:sp>
       <p:cxnSp>
         <p:nvCxnSpPr>
           <p:cNvPr id="13" name="Straight Connector 12"/>
@@ -3254,8 +3078,8 @@
         </p:nvCxnSpPr>
         <p:spPr>
           <a:xfrm flipH="1" flipV="1">
-            <a:off x="8565265" y="3635400"/>
-            <a:ext cx="1104616" cy="772306"/>
+            <a:off x="8604173" y="3746735"/>
+            <a:ext cx="1065708" cy="660971"/>
           </a:xfrm>
           <a:prstGeom prst="line">
             <a:avLst/>
@@ -3332,14 +3156,14 @@
       </p:sp>
       <p:sp>
         <p:nvSpPr>
-          <p:cNvPr id="19" name="Oval 18"/>
+          <p:cNvPr id="20" name="Oval 19"/>
           <p:cNvSpPr/>
           <p:nvPr/>
         </p:nvSpPr>
         <p:spPr>
           <a:xfrm>
-            <a:off x="1082614" y="1046983"/>
-            <a:ext cx="4941625" cy="1077675"/>
+            <a:off x="5596359" y="2820768"/>
+            <a:ext cx="4780345" cy="1077675"/>
           </a:xfrm>
           <a:prstGeom prst="ellipse">
             <a:avLst/>
@@ -3385,14 +3209,14 @@
       </p:sp>
       <p:sp>
         <p:nvSpPr>
-          <p:cNvPr id="20" name="Oval 19"/>
+          <p:cNvPr id="19" name="Oval 18"/>
           <p:cNvSpPr/>
           <p:nvPr/>
         </p:nvSpPr>
         <p:spPr>
           <a:xfrm>
-            <a:off x="5596359" y="2875344"/>
-            <a:ext cx="4780345" cy="1077675"/>
+            <a:off x="1082614" y="1046983"/>
+            <a:ext cx="4941625" cy="1077675"/>
           </a:xfrm>
           <a:prstGeom prst="ellipse">
             <a:avLst/>
@@ -3433,6 +3257,192 @@
           <a:p>
             <a:pPr algn="ctr"/>
             <a:endParaRPr lang="en-US"/>
+          </a:p>
+        </p:txBody>
+      </p:sp>
+      <p:sp>
+        <p:nvSpPr>
+          <p:cNvPr id="4" name="TextBox 3"/>
+          <p:cNvSpPr txBox="1"/>
+          <p:nvPr/>
+        </p:nvSpPr>
+        <p:spPr>
+          <a:xfrm>
+            <a:off x="1303058" y="1293434"/>
+            <a:ext cx="5464366" cy="584775"/>
+          </a:xfrm>
+          <a:prstGeom prst="rect">
+            <a:avLst/>
+          </a:prstGeom>
+          <a:noFill/>
+        </p:spPr>
+        <p:txBody>
+          <a:bodyPr wrap="square" rtlCol="0">
+            <a:spAutoFit/>
+          </a:bodyPr>
+          <a:lstStyle/>
+          <a:p>
+            <a:r>
+              <a:rPr lang="en-US" sz="3200" dirty="0" smtClean="0"/>
+              <a:t>Methodocracy Foundation</a:t>
+            </a:r>
+            <a:endParaRPr lang="en-US" sz="3200" dirty="0"/>
+          </a:p>
+        </p:txBody>
+      </p:sp>
+      <p:sp>
+        <p:nvSpPr>
+          <p:cNvPr id="5" name="TextBox 4"/>
+          <p:cNvSpPr txBox="1"/>
+          <p:nvPr/>
+        </p:nvSpPr>
+        <p:spPr>
+          <a:xfrm>
+            <a:off x="3208975" y="3112180"/>
+            <a:ext cx="1013552" cy="461665"/>
+          </a:xfrm>
+          <a:prstGeom prst="rect">
+            <a:avLst/>
+          </a:prstGeom>
+          <a:solidFill>
+            <a:schemeClr val="bg1"/>
+          </a:solidFill>
+        </p:spPr>
+        <p:txBody>
+          <a:bodyPr wrap="square" rtlCol="0">
+            <a:spAutoFit/>
+          </a:bodyPr>
+          <a:lstStyle/>
+          <a:p>
+            <a:r>
+              <a:rPr lang="en-US" sz="2400" dirty="0" smtClean="0"/>
+              <a:t>Makes</a:t>
+            </a:r>
+            <a:endParaRPr lang="en-US" sz="2400" dirty="0"/>
+          </a:p>
+        </p:txBody>
+      </p:sp>
+      <p:sp>
+        <p:nvSpPr>
+          <p:cNvPr id="6" name="TextBox 5"/>
+          <p:cNvSpPr txBox="1"/>
+          <p:nvPr/>
+        </p:nvSpPr>
+        <p:spPr>
+          <a:xfrm>
+            <a:off x="2041188" y="4807816"/>
+            <a:ext cx="4362679" cy="584775"/>
+          </a:xfrm>
+          <a:prstGeom prst="rect">
+            <a:avLst/>
+          </a:prstGeom>
+          <a:noFill/>
+        </p:spPr>
+        <p:txBody>
+          <a:bodyPr wrap="square" rtlCol="0">
+            <a:spAutoFit/>
+          </a:bodyPr>
+          <a:lstStyle/>
+          <a:p>
+            <a:r>
+              <a:rPr lang="en-US" sz="3200" dirty="0"/>
+              <a:t>m</a:t>
+            </a:r>
+            <a:r>
+              <a:rPr lang="en-US" sz="3200" dirty="0" smtClean="0"/>
+              <a:t>ethodocracy.org</a:t>
+            </a:r>
+            <a:endParaRPr lang="en-US" sz="3200" dirty="0"/>
+          </a:p>
+        </p:txBody>
+      </p:sp>
+      <p:sp>
+        <p:nvSpPr>
+          <p:cNvPr id="9" name="TextBox 8"/>
+          <p:cNvSpPr txBox="1"/>
+          <p:nvPr/>
+        </p:nvSpPr>
+        <p:spPr>
+          <a:xfrm>
+            <a:off x="9347246" y="2020548"/>
+            <a:ext cx="2612811" cy="400110"/>
+          </a:xfrm>
+          <a:prstGeom prst="rect">
+            <a:avLst/>
+          </a:prstGeom>
+          <a:noFill/>
+        </p:spPr>
+        <p:txBody>
+          <a:bodyPr wrap="square" rtlCol="0">
+            <a:spAutoFit/>
+          </a:bodyPr>
+          <a:lstStyle/>
+          <a:p>
+            <a:r>
+              <a:rPr lang="en-US" sz="2000" dirty="0" smtClean="0"/>
+              <a:t>Scientific</a:t>
+            </a:r>
+            <a:endParaRPr lang="en-US" sz="2000" dirty="0"/>
+          </a:p>
+        </p:txBody>
+      </p:sp>
+      <p:sp>
+        <p:nvSpPr>
+          <p:cNvPr id="10" name="TextBox 9"/>
+          <p:cNvSpPr txBox="1"/>
+          <p:nvPr/>
+        </p:nvSpPr>
+        <p:spPr>
+          <a:xfrm>
+            <a:off x="9221303" y="4407706"/>
+            <a:ext cx="1931594" cy="400110"/>
+          </a:xfrm>
+          <a:prstGeom prst="rect">
+            <a:avLst/>
+          </a:prstGeom>
+          <a:noFill/>
+        </p:spPr>
+        <p:txBody>
+          <a:bodyPr wrap="square" rtlCol="0">
+            <a:spAutoFit/>
+          </a:bodyPr>
+          <a:lstStyle/>
+          <a:p>
+            <a:r>
+              <a:rPr lang="en-US" sz="2000" dirty="0" smtClean="0"/>
+              <a:t>Educational</a:t>
+            </a:r>
+            <a:endParaRPr lang="en-US" sz="2000" dirty="0"/>
+          </a:p>
+        </p:txBody>
+      </p:sp>
+      <p:sp>
+        <p:nvSpPr>
+          <p:cNvPr id="11" name="TextBox 10"/>
+          <p:cNvSpPr txBox="1"/>
+          <p:nvPr/>
+        </p:nvSpPr>
+        <p:spPr>
+          <a:xfrm>
+            <a:off x="6168051" y="3050625"/>
+            <a:ext cx="4019049" cy="584775"/>
+          </a:xfrm>
+          <a:prstGeom prst="rect">
+            <a:avLst/>
+          </a:prstGeom>
+          <a:noFill/>
+        </p:spPr>
+        <p:txBody>
+          <a:bodyPr wrap="none" rtlCol="0">
+            <a:spAutoFit/>
+          </a:bodyPr>
+          <a:lstStyle/>
+          <a:p>
+            <a:r>
+              <a:rPr lang="en-US" sz="3200" dirty="0" smtClean="0"/>
+              <a:t>Nonprofit Organization</a:t>
+            </a:r>
+            <a:endParaRPr lang="en-US" sz="3200" dirty="0"/>
           </a:p>
         </p:txBody>
       </p:sp>
@@ -3466,10 +3476,2545 @@
           <a:chExt cx="0" cy="0"/>
         </a:xfrm>
       </p:grpSpPr>
+      <p:cxnSp>
+        <p:nvCxnSpPr>
+          <p:cNvPr id="7" name="Straight Connector 6"/>
+          <p:cNvCxnSpPr/>
+          <p:nvPr/>
+        </p:nvCxnSpPr>
+        <p:spPr>
+          <a:xfrm flipH="1">
+            <a:off x="5538414" y="2086798"/>
+            <a:ext cx="1534" cy="1086209"/>
+          </a:xfrm>
+          <a:prstGeom prst="line">
+            <a:avLst/>
+          </a:prstGeom>
+          <a:ln w="41275"/>
+        </p:spPr>
+        <p:style>
+          <a:lnRef idx="1">
+            <a:schemeClr val="dk1"/>
+          </a:lnRef>
+          <a:fillRef idx="0">
+            <a:schemeClr val="dk1"/>
+          </a:fillRef>
+          <a:effectRef idx="0">
+            <a:schemeClr val="dk1"/>
+          </a:effectRef>
+          <a:fontRef idx="minor">
+            <a:schemeClr val="tx1"/>
+          </a:fontRef>
+        </p:style>
+      </p:cxnSp>
+      <p:cxnSp>
+        <p:nvCxnSpPr>
+          <p:cNvPr id="9" name="Straight Connector 8"/>
+          <p:cNvCxnSpPr/>
+          <p:nvPr/>
+        </p:nvCxnSpPr>
+        <p:spPr>
+          <a:xfrm flipH="1">
+            <a:off x="3073706" y="3873820"/>
+            <a:ext cx="1033077" cy="510893"/>
+          </a:xfrm>
+          <a:prstGeom prst="line">
+            <a:avLst/>
+          </a:prstGeom>
+          <a:ln w="31750"/>
+        </p:spPr>
+        <p:style>
+          <a:lnRef idx="1">
+            <a:schemeClr val="dk1"/>
+          </a:lnRef>
+          <a:fillRef idx="0">
+            <a:schemeClr val="dk1"/>
+          </a:fillRef>
+          <a:effectRef idx="0">
+            <a:schemeClr val="dk1"/>
+          </a:effectRef>
+          <a:fontRef idx="minor">
+            <a:schemeClr val="tx1"/>
+          </a:fontRef>
+        </p:style>
+      </p:cxnSp>
+      <p:cxnSp>
+        <p:nvCxnSpPr>
+          <p:cNvPr id="11" name="Straight Connector 10"/>
+          <p:cNvCxnSpPr/>
+          <p:nvPr/>
+        </p:nvCxnSpPr>
+        <p:spPr>
+          <a:xfrm flipH="1" flipV="1">
+            <a:off x="6794479" y="3891408"/>
+            <a:ext cx="906311" cy="493305"/>
+          </a:xfrm>
+          <a:prstGeom prst="line">
+            <a:avLst/>
+          </a:prstGeom>
+          <a:ln w="31750"/>
+        </p:spPr>
+        <p:style>
+          <a:lnRef idx="1">
+            <a:schemeClr val="dk1"/>
+          </a:lnRef>
+          <a:fillRef idx="0">
+            <a:schemeClr val="dk1"/>
+          </a:fillRef>
+          <a:effectRef idx="0">
+            <a:schemeClr val="dk1"/>
+          </a:effectRef>
+          <a:fontRef idx="minor">
+            <a:schemeClr val="tx1"/>
+          </a:fontRef>
+        </p:style>
+      </p:cxnSp>
+      <p:cxnSp>
+        <p:nvCxnSpPr>
+          <p:cNvPr id="13" name="Straight Connector 12"/>
+          <p:cNvCxnSpPr/>
+          <p:nvPr/>
+        </p:nvCxnSpPr>
+        <p:spPr>
+          <a:xfrm flipH="1">
+            <a:off x="5539948" y="4150405"/>
+            <a:ext cx="1" cy="1206974"/>
+          </a:xfrm>
+          <a:prstGeom prst="line">
+            <a:avLst/>
+          </a:prstGeom>
+          <a:ln w="31750"/>
+        </p:spPr>
+        <p:style>
+          <a:lnRef idx="1">
+            <a:schemeClr val="dk1"/>
+          </a:lnRef>
+          <a:fillRef idx="0">
+            <a:schemeClr val="dk1"/>
+          </a:fillRef>
+          <a:effectRef idx="0">
+            <a:schemeClr val="dk1"/>
+          </a:effectRef>
+          <a:fontRef idx="minor">
+            <a:schemeClr val="tx1"/>
+          </a:fontRef>
+        </p:style>
+      </p:cxnSp>
+      <p:sp>
+        <p:nvSpPr>
+          <p:cNvPr id="19" name="Oval 18"/>
+          <p:cNvSpPr/>
+          <p:nvPr/>
+        </p:nvSpPr>
+        <p:spPr>
+          <a:xfrm>
+            <a:off x="7626790" y="4010483"/>
+            <a:ext cx="3893735" cy="909811"/>
+          </a:xfrm>
+          <a:prstGeom prst="ellipse">
+            <a:avLst/>
+          </a:prstGeom>
+          <a:solidFill>
+            <a:schemeClr val="accent1">
+              <a:alpha val="25000"/>
+            </a:schemeClr>
+          </a:solidFill>
+          <a:ln>
+            <a:solidFill>
+              <a:schemeClr val="accent1">
+                <a:shade val="50000"/>
+                <a:alpha val="25000"/>
+              </a:schemeClr>
+            </a:solidFill>
+          </a:ln>
+        </p:spPr>
+        <p:style>
+          <a:lnRef idx="2">
+            <a:schemeClr val="accent1">
+              <a:shade val="50000"/>
+            </a:schemeClr>
+          </a:lnRef>
+          <a:fillRef idx="1">
+            <a:schemeClr val="accent1"/>
+          </a:fillRef>
+          <a:effectRef idx="0">
+            <a:schemeClr val="accent1"/>
+          </a:effectRef>
+          <a:fontRef idx="minor">
+            <a:schemeClr val="lt1"/>
+          </a:fontRef>
+        </p:style>
+        <p:txBody>
+          <a:bodyPr rtlCol="0" anchor="ctr"/>
+          <a:lstStyle/>
+          <a:p>
+            <a:pPr algn="ctr"/>
+            <a:endParaRPr lang="en-US"/>
+          </a:p>
+        </p:txBody>
+      </p:sp>
+      <p:sp>
+        <p:nvSpPr>
+          <p:cNvPr id="18" name="Oval 17"/>
+          <p:cNvSpPr/>
+          <p:nvPr/>
+        </p:nvSpPr>
+        <p:spPr>
+          <a:xfrm>
+            <a:off x="2281467" y="5150615"/>
+            <a:ext cx="7325241" cy="1403576"/>
+          </a:xfrm>
+          <a:prstGeom prst="ellipse">
+            <a:avLst/>
+          </a:prstGeom>
+          <a:solidFill>
+            <a:schemeClr val="accent1">
+              <a:alpha val="25000"/>
+            </a:schemeClr>
+          </a:solidFill>
+          <a:ln>
+            <a:solidFill>
+              <a:schemeClr val="accent1">
+                <a:shade val="50000"/>
+                <a:alpha val="25000"/>
+              </a:schemeClr>
+            </a:solidFill>
+          </a:ln>
+        </p:spPr>
+        <p:style>
+          <a:lnRef idx="2">
+            <a:schemeClr val="accent1">
+              <a:shade val="50000"/>
+            </a:schemeClr>
+          </a:lnRef>
+          <a:fillRef idx="1">
+            <a:schemeClr val="accent1"/>
+          </a:fillRef>
+          <a:effectRef idx="0">
+            <a:schemeClr val="accent1"/>
+          </a:effectRef>
+          <a:fontRef idx="minor">
+            <a:schemeClr val="lt1"/>
+          </a:fontRef>
+        </p:style>
+        <p:txBody>
+          <a:bodyPr rtlCol="0" anchor="ctr"/>
+          <a:lstStyle/>
+          <a:p>
+            <a:pPr algn="ctr"/>
+            <a:endParaRPr lang="en-US"/>
+          </a:p>
+        </p:txBody>
+      </p:sp>
+      <p:sp>
+        <p:nvSpPr>
+          <p:cNvPr id="17" name="Oval 16"/>
+          <p:cNvSpPr/>
+          <p:nvPr/>
+        </p:nvSpPr>
+        <p:spPr>
+          <a:xfrm>
+            <a:off x="931762" y="4085897"/>
+            <a:ext cx="2330833" cy="758984"/>
+          </a:xfrm>
+          <a:prstGeom prst="ellipse">
+            <a:avLst/>
+          </a:prstGeom>
+          <a:solidFill>
+            <a:schemeClr val="accent1">
+              <a:alpha val="25000"/>
+            </a:schemeClr>
+          </a:solidFill>
+          <a:ln>
+            <a:solidFill>
+              <a:schemeClr val="accent1">
+                <a:shade val="50000"/>
+                <a:alpha val="25000"/>
+              </a:schemeClr>
+            </a:solidFill>
+          </a:ln>
+        </p:spPr>
+        <p:style>
+          <a:lnRef idx="2">
+            <a:schemeClr val="accent1">
+              <a:shade val="50000"/>
+            </a:schemeClr>
+          </a:lnRef>
+          <a:fillRef idx="1">
+            <a:schemeClr val="accent1"/>
+          </a:fillRef>
+          <a:effectRef idx="0">
+            <a:schemeClr val="accent1"/>
+          </a:effectRef>
+          <a:fontRef idx="minor">
+            <a:schemeClr val="lt1"/>
+          </a:fontRef>
+        </p:style>
+        <p:txBody>
+          <a:bodyPr rtlCol="0" anchor="ctr"/>
+          <a:lstStyle/>
+          <a:p>
+            <a:pPr algn="ctr"/>
+            <a:endParaRPr lang="en-US"/>
+          </a:p>
+        </p:txBody>
+      </p:sp>
+      <p:sp>
+        <p:nvSpPr>
+          <p:cNvPr id="16" name="Oval 15"/>
+          <p:cNvSpPr/>
+          <p:nvPr/>
+        </p:nvSpPr>
+        <p:spPr>
+          <a:xfrm>
+            <a:off x="3452869" y="3001988"/>
+            <a:ext cx="4115719" cy="1278735"/>
+          </a:xfrm>
+          <a:prstGeom prst="ellipse">
+            <a:avLst/>
+          </a:prstGeom>
+          <a:solidFill>
+            <a:schemeClr val="accent1">
+              <a:alpha val="25000"/>
+            </a:schemeClr>
+          </a:solidFill>
+          <a:ln>
+            <a:solidFill>
+              <a:schemeClr val="accent1">
+                <a:shade val="50000"/>
+                <a:alpha val="25000"/>
+              </a:schemeClr>
+            </a:solidFill>
+          </a:ln>
+        </p:spPr>
+        <p:style>
+          <a:lnRef idx="2">
+            <a:schemeClr val="accent1">
+              <a:shade val="50000"/>
+            </a:schemeClr>
+          </a:lnRef>
+          <a:fillRef idx="1">
+            <a:schemeClr val="accent1"/>
+          </a:fillRef>
+          <a:effectRef idx="0">
+            <a:schemeClr val="accent1"/>
+          </a:effectRef>
+          <a:fontRef idx="minor">
+            <a:schemeClr val="lt1"/>
+          </a:fontRef>
+        </p:style>
+        <p:txBody>
+          <a:bodyPr rtlCol="0" anchor="ctr"/>
+          <a:lstStyle/>
+          <a:p>
+            <a:pPr algn="ctr"/>
+            <a:endParaRPr lang="en-US"/>
+          </a:p>
+        </p:txBody>
+      </p:sp>
+      <p:sp>
+        <p:nvSpPr>
+          <p:cNvPr id="15" name="Oval 14"/>
+          <p:cNvSpPr/>
+          <p:nvPr/>
+        </p:nvSpPr>
+        <p:spPr>
+          <a:xfrm>
+            <a:off x="2788243" y="704713"/>
+            <a:ext cx="5419323" cy="1403576"/>
+          </a:xfrm>
+          <a:prstGeom prst="ellipse">
+            <a:avLst/>
+          </a:prstGeom>
+          <a:solidFill>
+            <a:schemeClr val="accent1">
+              <a:alpha val="25000"/>
+            </a:schemeClr>
+          </a:solidFill>
+          <a:ln>
+            <a:solidFill>
+              <a:schemeClr val="accent1">
+                <a:shade val="50000"/>
+                <a:alpha val="25000"/>
+              </a:schemeClr>
+            </a:solidFill>
+          </a:ln>
+        </p:spPr>
+        <p:style>
+          <a:lnRef idx="2">
+            <a:schemeClr val="accent1">
+              <a:shade val="50000"/>
+            </a:schemeClr>
+          </a:lnRef>
+          <a:fillRef idx="1">
+            <a:schemeClr val="accent1"/>
+          </a:fillRef>
+          <a:effectRef idx="0">
+            <a:schemeClr val="accent1"/>
+          </a:effectRef>
+          <a:fontRef idx="minor">
+            <a:schemeClr val="lt1"/>
+          </a:fontRef>
+        </p:style>
+        <p:txBody>
+          <a:bodyPr rtlCol="0" anchor="ctr"/>
+          <a:lstStyle/>
+          <a:p>
+            <a:pPr algn="ctr"/>
+            <a:endParaRPr lang="en-US"/>
+          </a:p>
+        </p:txBody>
+      </p:sp>
+      <p:sp>
+        <p:nvSpPr>
+          <p:cNvPr id="2" name="TextBox 1"/>
+          <p:cNvSpPr txBox="1"/>
+          <p:nvPr/>
+        </p:nvSpPr>
+        <p:spPr>
+          <a:xfrm>
+            <a:off x="2644048" y="5541484"/>
+            <a:ext cx="6808424" cy="646331"/>
+          </a:xfrm>
+          <a:prstGeom prst="rect">
+            <a:avLst/>
+          </a:prstGeom>
+          <a:noFill/>
+        </p:spPr>
+        <p:txBody>
+          <a:bodyPr wrap="square" rtlCol="0">
+            <a:spAutoFit/>
+          </a:bodyPr>
+          <a:lstStyle/>
+          <a:p>
+            <a:r>
+              <a:rPr lang="en-US" dirty="0"/>
+              <a:t>H</a:t>
+            </a:r>
+            <a:r>
+              <a:rPr lang="en-US" dirty="0" smtClean="0"/>
+              <a:t>ighly </a:t>
+            </a:r>
+            <a:r>
+              <a:rPr lang="en-US" dirty="0"/>
+              <a:t>motivated individual wanting to improve the world as much as possible before his death</a:t>
+            </a:r>
+            <a:r>
+              <a:rPr lang="en-US" dirty="0" smtClean="0"/>
+              <a:t>.</a:t>
+            </a:r>
+            <a:endParaRPr lang="en-US" dirty="0"/>
+          </a:p>
+        </p:txBody>
+      </p:sp>
+      <p:sp>
+        <p:nvSpPr>
+          <p:cNvPr id="3" name="TextBox 2"/>
+          <p:cNvSpPr txBox="1"/>
+          <p:nvPr/>
+        </p:nvSpPr>
+        <p:spPr>
+          <a:xfrm>
+            <a:off x="7837584" y="4281660"/>
+            <a:ext cx="3553857" cy="369332"/>
+          </a:xfrm>
+          <a:prstGeom prst="rect">
+            <a:avLst/>
+          </a:prstGeom>
+          <a:noFill/>
+        </p:spPr>
+        <p:txBody>
+          <a:bodyPr wrap="square" rtlCol="0">
+            <a:spAutoFit/>
+          </a:bodyPr>
+          <a:lstStyle/>
+          <a:p>
+            <a:r>
+              <a:rPr lang="en-US" dirty="0" smtClean="0"/>
+              <a:t>Tested 99.9</a:t>
+            </a:r>
+            <a:r>
+              <a:rPr lang="en-US" baseline="30000" dirty="0" smtClean="0"/>
+              <a:t>th</a:t>
+            </a:r>
+            <a:r>
+              <a:rPr lang="en-US" dirty="0" smtClean="0"/>
+              <a:t> percentile intelligence</a:t>
+            </a:r>
+            <a:endParaRPr lang="en-US" dirty="0"/>
+          </a:p>
+        </p:txBody>
+      </p:sp>
+      <p:sp>
+        <p:nvSpPr>
+          <p:cNvPr id="4" name="TextBox 3"/>
+          <p:cNvSpPr txBox="1"/>
+          <p:nvPr/>
+        </p:nvSpPr>
+        <p:spPr>
+          <a:xfrm>
+            <a:off x="1175131" y="4280723"/>
+            <a:ext cx="2140944" cy="369332"/>
+          </a:xfrm>
+          <a:prstGeom prst="rect">
+            <a:avLst/>
+          </a:prstGeom>
+          <a:noFill/>
+        </p:spPr>
+        <p:txBody>
+          <a:bodyPr wrap="square" rtlCol="0">
+            <a:spAutoFit/>
+          </a:bodyPr>
+          <a:lstStyle/>
+          <a:p>
+            <a:r>
+              <a:rPr lang="en-US" dirty="0" smtClean="0"/>
+              <a:t>Born March 1994</a:t>
+            </a:r>
+            <a:endParaRPr lang="en-US" dirty="0"/>
+          </a:p>
+        </p:txBody>
+      </p:sp>
+      <p:sp>
+        <p:nvSpPr>
+          <p:cNvPr id="5" name="TextBox 4"/>
+          <p:cNvSpPr txBox="1"/>
+          <p:nvPr/>
+        </p:nvSpPr>
+        <p:spPr>
+          <a:xfrm>
+            <a:off x="3855903" y="3265060"/>
+            <a:ext cx="3371161" cy="830997"/>
+          </a:xfrm>
+          <a:prstGeom prst="rect">
+            <a:avLst/>
+          </a:prstGeom>
+          <a:noFill/>
+        </p:spPr>
+        <p:txBody>
+          <a:bodyPr wrap="square" rtlCol="0">
+            <a:spAutoFit/>
+          </a:bodyPr>
+          <a:lstStyle/>
+          <a:p>
+            <a:pPr algn="ctr"/>
+            <a:r>
+              <a:rPr lang="en-US" sz="2400" dirty="0" smtClean="0"/>
+              <a:t>Founder, Chairman, CEO:</a:t>
+            </a:r>
+          </a:p>
+          <a:p>
+            <a:pPr algn="ctr"/>
+            <a:r>
+              <a:rPr lang="en-US" sz="2400" dirty="0" smtClean="0"/>
+              <a:t>Zachary Hebert</a:t>
+            </a:r>
+            <a:endParaRPr lang="en-US" sz="2400" dirty="0"/>
+          </a:p>
+        </p:txBody>
+      </p:sp>
+      <p:sp>
+        <p:nvSpPr>
+          <p:cNvPr id="6" name="TextBox 5"/>
+          <p:cNvSpPr txBox="1"/>
+          <p:nvPr/>
+        </p:nvSpPr>
+        <p:spPr>
+          <a:xfrm>
+            <a:off x="3211415" y="926520"/>
+            <a:ext cx="4660135" cy="1077218"/>
+          </a:xfrm>
+          <a:prstGeom prst="rect">
+            <a:avLst/>
+          </a:prstGeom>
+          <a:noFill/>
+        </p:spPr>
+        <p:txBody>
+          <a:bodyPr wrap="square" rtlCol="0">
+            <a:spAutoFit/>
+          </a:bodyPr>
+          <a:lstStyle/>
+          <a:p>
+            <a:pPr algn="ctr"/>
+            <a:r>
+              <a:rPr lang="en-US" sz="3200" dirty="0" smtClean="0"/>
+              <a:t>Only 1 Management Team</a:t>
+            </a:r>
+          </a:p>
+          <a:p>
+            <a:pPr algn="ctr"/>
+            <a:r>
+              <a:rPr lang="en-US" sz="3200" dirty="0" smtClean="0"/>
+              <a:t>Member Thus Far</a:t>
+            </a:r>
+            <a:endParaRPr lang="en-US" sz="3200" dirty="0"/>
+          </a:p>
+        </p:txBody>
+      </p:sp>
     </p:spTree>
     <p:extLst>
       <p:ext uri="{BB962C8B-B14F-4D97-AF65-F5344CB8AC3E}">
         <p14:creationId xmlns:p14="http://schemas.microsoft.com/office/powerpoint/2010/main" val="3666346375"/>
+      </p:ext>
+    </p:extLst>
+  </p:cSld>
+  <p:clrMapOvr>
+    <a:masterClrMapping/>
+  </p:clrMapOvr>
+</p:sld>
+</file>
+
+<file path=ppt/slides/slide3.xml><?xml version="1.0" encoding="utf-8"?>
+<p:sld xmlns:a="http://schemas.openxmlformats.org/drawingml/2006/main" xmlns:r="http://schemas.openxmlformats.org/officeDocument/2006/relationships" xmlns:p="http://schemas.openxmlformats.org/presentationml/2006/main">
+  <p:cSld>
+    <p:spTree>
+      <p:nvGrpSpPr>
+        <p:cNvPr id="1" name=""/>
+        <p:cNvGrpSpPr/>
+        <p:nvPr/>
+      </p:nvGrpSpPr>
+      <p:grpSpPr>
+        <a:xfrm>
+          <a:off x="0" y="0"/>
+          <a:ext cx="0" cy="0"/>
+          <a:chOff x="0" y="0"/>
+          <a:chExt cx="0" cy="0"/>
+        </a:xfrm>
+      </p:grpSpPr>
+      <p:cxnSp>
+        <p:nvCxnSpPr>
+          <p:cNvPr id="25" name="Straight Connector 24"/>
+          <p:cNvCxnSpPr/>
+          <p:nvPr/>
+        </p:nvCxnSpPr>
+        <p:spPr>
+          <a:xfrm flipH="1" flipV="1">
+            <a:off x="7612655" y="3816732"/>
+            <a:ext cx="969481" cy="374531"/>
+          </a:xfrm>
+          <a:prstGeom prst="line">
+            <a:avLst/>
+          </a:prstGeom>
+          <a:ln w="31750"/>
+        </p:spPr>
+        <p:style>
+          <a:lnRef idx="1">
+            <a:schemeClr val="dk1"/>
+          </a:lnRef>
+          <a:fillRef idx="0">
+            <a:schemeClr val="dk1"/>
+          </a:fillRef>
+          <a:effectRef idx="0">
+            <a:schemeClr val="dk1"/>
+          </a:effectRef>
+          <a:fontRef idx="minor">
+            <a:schemeClr val="tx1"/>
+          </a:fontRef>
+        </p:style>
+      </p:cxnSp>
+      <p:cxnSp>
+        <p:nvCxnSpPr>
+          <p:cNvPr id="28" name="Straight Connector 27"/>
+          <p:cNvCxnSpPr/>
+          <p:nvPr/>
+        </p:nvCxnSpPr>
+        <p:spPr>
+          <a:xfrm flipH="1">
+            <a:off x="7072826" y="2295059"/>
+            <a:ext cx="1388126" cy="707971"/>
+          </a:xfrm>
+          <a:prstGeom prst="line">
+            <a:avLst/>
+          </a:prstGeom>
+          <a:ln w="31750"/>
+        </p:spPr>
+        <p:style>
+          <a:lnRef idx="1">
+            <a:schemeClr val="dk1"/>
+          </a:lnRef>
+          <a:fillRef idx="0">
+            <a:schemeClr val="dk1"/>
+          </a:fillRef>
+          <a:effectRef idx="0">
+            <a:schemeClr val="dk1"/>
+          </a:effectRef>
+          <a:fontRef idx="minor">
+            <a:schemeClr val="tx1"/>
+          </a:fontRef>
+        </p:style>
+      </p:cxnSp>
+      <p:cxnSp>
+        <p:nvCxnSpPr>
+          <p:cNvPr id="30" name="Straight Connector 29"/>
+          <p:cNvCxnSpPr/>
+          <p:nvPr/>
+        </p:nvCxnSpPr>
+        <p:spPr>
+          <a:xfrm>
+            <a:off x="5858039" y="1632295"/>
+            <a:ext cx="9555" cy="1266127"/>
+          </a:xfrm>
+          <a:prstGeom prst="line">
+            <a:avLst/>
+          </a:prstGeom>
+          <a:ln w="31750"/>
+        </p:spPr>
+        <p:style>
+          <a:lnRef idx="1">
+            <a:schemeClr val="dk1"/>
+          </a:lnRef>
+          <a:fillRef idx="0">
+            <a:schemeClr val="dk1"/>
+          </a:fillRef>
+          <a:effectRef idx="0">
+            <a:schemeClr val="dk1"/>
+          </a:effectRef>
+          <a:fontRef idx="minor">
+            <a:schemeClr val="tx1"/>
+          </a:fontRef>
+        </p:style>
+      </p:cxnSp>
+      <p:cxnSp>
+        <p:nvCxnSpPr>
+          <p:cNvPr id="32" name="Straight Connector 31"/>
+          <p:cNvCxnSpPr/>
+          <p:nvPr/>
+        </p:nvCxnSpPr>
+        <p:spPr>
+          <a:xfrm flipH="1" flipV="1">
+            <a:off x="6393275" y="3944610"/>
+            <a:ext cx="974072" cy="1310636"/>
+          </a:xfrm>
+          <a:prstGeom prst="line">
+            <a:avLst/>
+          </a:prstGeom>
+          <a:ln w="31750"/>
+        </p:spPr>
+        <p:style>
+          <a:lnRef idx="1">
+            <a:schemeClr val="dk1"/>
+          </a:lnRef>
+          <a:fillRef idx="0">
+            <a:schemeClr val="dk1"/>
+          </a:fillRef>
+          <a:effectRef idx="0">
+            <a:schemeClr val="dk1"/>
+          </a:effectRef>
+          <a:fontRef idx="minor">
+            <a:schemeClr val="tx1"/>
+          </a:fontRef>
+        </p:style>
+      </p:cxnSp>
+      <p:cxnSp>
+        <p:nvCxnSpPr>
+          <p:cNvPr id="37" name="Straight Connector 36"/>
+          <p:cNvCxnSpPr/>
+          <p:nvPr/>
+        </p:nvCxnSpPr>
+        <p:spPr>
+          <a:xfrm flipV="1">
+            <a:off x="4538946" y="3944610"/>
+            <a:ext cx="899829" cy="1310636"/>
+          </a:xfrm>
+          <a:prstGeom prst="line">
+            <a:avLst/>
+          </a:prstGeom>
+          <a:ln w="31750"/>
+        </p:spPr>
+        <p:style>
+          <a:lnRef idx="1">
+            <a:schemeClr val="dk1"/>
+          </a:lnRef>
+          <a:fillRef idx="0">
+            <a:schemeClr val="dk1"/>
+          </a:fillRef>
+          <a:effectRef idx="0">
+            <a:schemeClr val="dk1"/>
+          </a:effectRef>
+          <a:fontRef idx="minor">
+            <a:schemeClr val="tx1"/>
+          </a:fontRef>
+        </p:style>
+      </p:cxnSp>
+      <p:cxnSp>
+        <p:nvCxnSpPr>
+          <p:cNvPr id="41" name="Straight Connector 40"/>
+          <p:cNvCxnSpPr/>
+          <p:nvPr/>
+        </p:nvCxnSpPr>
+        <p:spPr>
+          <a:xfrm flipV="1">
+            <a:off x="3324157" y="3862671"/>
+            <a:ext cx="983436" cy="141326"/>
+          </a:xfrm>
+          <a:prstGeom prst="line">
+            <a:avLst/>
+          </a:prstGeom>
+          <a:ln w="31750"/>
+        </p:spPr>
+        <p:style>
+          <a:lnRef idx="1">
+            <a:schemeClr val="dk1"/>
+          </a:lnRef>
+          <a:fillRef idx="0">
+            <a:schemeClr val="dk1"/>
+          </a:fillRef>
+          <a:effectRef idx="0">
+            <a:schemeClr val="dk1"/>
+          </a:effectRef>
+          <a:fontRef idx="minor">
+            <a:schemeClr val="tx1"/>
+          </a:fontRef>
+        </p:style>
+      </p:cxnSp>
+      <p:cxnSp>
+        <p:nvCxnSpPr>
+          <p:cNvPr id="43" name="Straight Connector 42"/>
+          <p:cNvCxnSpPr/>
+          <p:nvPr/>
+        </p:nvCxnSpPr>
+        <p:spPr>
+          <a:xfrm>
+            <a:off x="3649266" y="2406942"/>
+            <a:ext cx="1112882" cy="560961"/>
+          </a:xfrm>
+          <a:prstGeom prst="line">
+            <a:avLst/>
+          </a:prstGeom>
+          <a:ln w="31750"/>
+        </p:spPr>
+        <p:style>
+          <a:lnRef idx="1">
+            <a:schemeClr val="dk1"/>
+          </a:lnRef>
+          <a:fillRef idx="0">
+            <a:schemeClr val="dk1"/>
+          </a:fillRef>
+          <a:effectRef idx="0">
+            <a:schemeClr val="dk1"/>
+          </a:effectRef>
+          <a:fontRef idx="minor">
+            <a:schemeClr val="tx1"/>
+          </a:fontRef>
+        </p:style>
+      </p:cxnSp>
+      <p:sp>
+        <p:nvSpPr>
+          <p:cNvPr id="24" name="Oval 23"/>
+          <p:cNvSpPr/>
+          <p:nvPr/>
+        </p:nvSpPr>
+        <p:spPr>
+          <a:xfrm>
+            <a:off x="1938965" y="1549674"/>
+            <a:ext cx="1663547" cy="1278735"/>
+          </a:xfrm>
+          <a:prstGeom prst="ellipse">
+            <a:avLst/>
+          </a:prstGeom>
+          <a:solidFill>
+            <a:schemeClr val="accent1">
+              <a:alpha val="25000"/>
+            </a:schemeClr>
+          </a:solidFill>
+          <a:ln>
+            <a:solidFill>
+              <a:schemeClr val="accent1">
+                <a:shade val="50000"/>
+                <a:alpha val="25000"/>
+              </a:schemeClr>
+            </a:solidFill>
+          </a:ln>
+        </p:spPr>
+        <p:style>
+          <a:lnRef idx="2">
+            <a:schemeClr val="accent1">
+              <a:shade val="50000"/>
+            </a:schemeClr>
+          </a:lnRef>
+          <a:fillRef idx="1">
+            <a:schemeClr val="accent1"/>
+          </a:fillRef>
+          <a:effectRef idx="0">
+            <a:schemeClr val="accent1"/>
+          </a:effectRef>
+          <a:fontRef idx="minor">
+            <a:schemeClr val="lt1"/>
+          </a:fontRef>
+        </p:style>
+        <p:txBody>
+          <a:bodyPr rtlCol="0" anchor="ctr"/>
+          <a:lstStyle/>
+          <a:p>
+            <a:pPr algn="ctr"/>
+            <a:endParaRPr lang="en-US"/>
+          </a:p>
+        </p:txBody>
+      </p:sp>
+      <p:sp>
+        <p:nvSpPr>
+          <p:cNvPr id="23" name="Oval 22"/>
+          <p:cNvSpPr/>
+          <p:nvPr/>
+        </p:nvSpPr>
+        <p:spPr>
+          <a:xfrm>
+            <a:off x="1349563" y="3443770"/>
+            <a:ext cx="1663547" cy="1278735"/>
+          </a:xfrm>
+          <a:prstGeom prst="ellipse">
+            <a:avLst/>
+          </a:prstGeom>
+          <a:solidFill>
+            <a:schemeClr val="accent1">
+              <a:alpha val="25000"/>
+            </a:schemeClr>
+          </a:solidFill>
+          <a:ln>
+            <a:solidFill>
+              <a:schemeClr val="accent1">
+                <a:shade val="50000"/>
+                <a:alpha val="25000"/>
+              </a:schemeClr>
+            </a:solidFill>
+          </a:ln>
+        </p:spPr>
+        <p:style>
+          <a:lnRef idx="2">
+            <a:schemeClr val="accent1">
+              <a:shade val="50000"/>
+            </a:schemeClr>
+          </a:lnRef>
+          <a:fillRef idx="1">
+            <a:schemeClr val="accent1"/>
+          </a:fillRef>
+          <a:effectRef idx="0">
+            <a:schemeClr val="accent1"/>
+          </a:effectRef>
+          <a:fontRef idx="minor">
+            <a:schemeClr val="lt1"/>
+          </a:fontRef>
+        </p:style>
+        <p:txBody>
+          <a:bodyPr rtlCol="0" anchor="ctr"/>
+          <a:lstStyle/>
+          <a:p>
+            <a:pPr algn="ctr"/>
+            <a:endParaRPr lang="en-US"/>
+          </a:p>
+        </p:txBody>
+      </p:sp>
+      <p:sp>
+        <p:nvSpPr>
+          <p:cNvPr id="22" name="Oval 21"/>
+          <p:cNvSpPr/>
+          <p:nvPr/>
+        </p:nvSpPr>
+        <p:spPr>
+          <a:xfrm>
+            <a:off x="3398702" y="5074320"/>
+            <a:ext cx="1663547" cy="1278735"/>
+          </a:xfrm>
+          <a:prstGeom prst="ellipse">
+            <a:avLst/>
+          </a:prstGeom>
+          <a:solidFill>
+            <a:schemeClr val="accent1">
+              <a:alpha val="25000"/>
+            </a:schemeClr>
+          </a:solidFill>
+          <a:ln>
+            <a:solidFill>
+              <a:schemeClr val="accent1">
+                <a:shade val="50000"/>
+                <a:alpha val="25000"/>
+              </a:schemeClr>
+            </a:solidFill>
+          </a:ln>
+        </p:spPr>
+        <p:style>
+          <a:lnRef idx="2">
+            <a:schemeClr val="accent1">
+              <a:shade val="50000"/>
+            </a:schemeClr>
+          </a:lnRef>
+          <a:fillRef idx="1">
+            <a:schemeClr val="accent1"/>
+          </a:fillRef>
+          <a:effectRef idx="0">
+            <a:schemeClr val="accent1"/>
+          </a:effectRef>
+          <a:fontRef idx="minor">
+            <a:schemeClr val="lt1"/>
+          </a:fontRef>
+        </p:style>
+        <p:txBody>
+          <a:bodyPr rtlCol="0" anchor="ctr"/>
+          <a:lstStyle/>
+          <a:p>
+            <a:pPr algn="ctr"/>
+            <a:endParaRPr lang="en-US"/>
+          </a:p>
+        </p:txBody>
+      </p:sp>
+      <p:sp>
+        <p:nvSpPr>
+          <p:cNvPr id="21" name="Oval 20"/>
+          <p:cNvSpPr/>
+          <p:nvPr/>
+        </p:nvSpPr>
+        <p:spPr>
+          <a:xfrm>
+            <a:off x="6918589" y="5092933"/>
+            <a:ext cx="1663547" cy="1278735"/>
+          </a:xfrm>
+          <a:prstGeom prst="ellipse">
+            <a:avLst/>
+          </a:prstGeom>
+          <a:solidFill>
+            <a:schemeClr val="accent1">
+              <a:alpha val="25000"/>
+            </a:schemeClr>
+          </a:solidFill>
+          <a:ln>
+            <a:solidFill>
+              <a:schemeClr val="accent1">
+                <a:shade val="50000"/>
+                <a:alpha val="25000"/>
+              </a:schemeClr>
+            </a:solidFill>
+          </a:ln>
+        </p:spPr>
+        <p:style>
+          <a:lnRef idx="2">
+            <a:schemeClr val="accent1">
+              <a:shade val="50000"/>
+            </a:schemeClr>
+          </a:lnRef>
+          <a:fillRef idx="1">
+            <a:schemeClr val="accent1"/>
+          </a:fillRef>
+          <a:effectRef idx="0">
+            <a:schemeClr val="accent1"/>
+          </a:effectRef>
+          <a:fontRef idx="minor">
+            <a:schemeClr val="lt1"/>
+          </a:fontRef>
+        </p:style>
+        <p:txBody>
+          <a:bodyPr rtlCol="0" anchor="ctr"/>
+          <a:lstStyle/>
+          <a:p>
+            <a:pPr algn="ctr"/>
+            <a:endParaRPr lang="en-US"/>
+          </a:p>
+        </p:txBody>
+      </p:sp>
+      <p:sp>
+        <p:nvSpPr>
+          <p:cNvPr id="20" name="Oval 19"/>
+          <p:cNvSpPr/>
+          <p:nvPr/>
+        </p:nvSpPr>
+        <p:spPr>
+          <a:xfrm>
+            <a:off x="9121962" y="3551895"/>
+            <a:ext cx="1663547" cy="1278735"/>
+          </a:xfrm>
+          <a:prstGeom prst="ellipse">
+            <a:avLst/>
+          </a:prstGeom>
+          <a:solidFill>
+            <a:schemeClr val="accent1">
+              <a:alpha val="25000"/>
+            </a:schemeClr>
+          </a:solidFill>
+          <a:ln>
+            <a:solidFill>
+              <a:schemeClr val="accent1">
+                <a:shade val="50000"/>
+                <a:alpha val="25000"/>
+              </a:schemeClr>
+            </a:solidFill>
+          </a:ln>
+        </p:spPr>
+        <p:style>
+          <a:lnRef idx="2">
+            <a:schemeClr val="accent1">
+              <a:shade val="50000"/>
+            </a:schemeClr>
+          </a:lnRef>
+          <a:fillRef idx="1">
+            <a:schemeClr val="accent1"/>
+          </a:fillRef>
+          <a:effectRef idx="0">
+            <a:schemeClr val="accent1"/>
+          </a:effectRef>
+          <a:fontRef idx="minor">
+            <a:schemeClr val="lt1"/>
+          </a:fontRef>
+        </p:style>
+        <p:txBody>
+          <a:bodyPr rtlCol="0" anchor="ctr"/>
+          <a:lstStyle/>
+          <a:p>
+            <a:pPr algn="ctr"/>
+            <a:endParaRPr lang="en-US"/>
+          </a:p>
+        </p:txBody>
+      </p:sp>
+      <p:sp>
+        <p:nvSpPr>
+          <p:cNvPr id="19" name="Oval 18"/>
+          <p:cNvSpPr/>
+          <p:nvPr/>
+        </p:nvSpPr>
+        <p:spPr>
+          <a:xfrm>
+            <a:off x="8328752" y="1444408"/>
+            <a:ext cx="1663547" cy="1278735"/>
+          </a:xfrm>
+          <a:prstGeom prst="ellipse">
+            <a:avLst/>
+          </a:prstGeom>
+          <a:solidFill>
+            <a:schemeClr val="accent1">
+              <a:alpha val="25000"/>
+            </a:schemeClr>
+          </a:solidFill>
+          <a:ln>
+            <a:solidFill>
+              <a:schemeClr val="accent1">
+                <a:shade val="50000"/>
+                <a:alpha val="25000"/>
+              </a:schemeClr>
+            </a:solidFill>
+          </a:ln>
+        </p:spPr>
+        <p:style>
+          <a:lnRef idx="2">
+            <a:schemeClr val="accent1">
+              <a:shade val="50000"/>
+            </a:schemeClr>
+          </a:lnRef>
+          <a:fillRef idx="1">
+            <a:schemeClr val="accent1"/>
+          </a:fillRef>
+          <a:effectRef idx="0">
+            <a:schemeClr val="accent1"/>
+          </a:effectRef>
+          <a:fontRef idx="minor">
+            <a:schemeClr val="lt1"/>
+          </a:fontRef>
+        </p:style>
+        <p:txBody>
+          <a:bodyPr rtlCol="0" anchor="ctr"/>
+          <a:lstStyle/>
+          <a:p>
+            <a:pPr algn="ctr"/>
+            <a:endParaRPr lang="en-US"/>
+          </a:p>
+        </p:txBody>
+      </p:sp>
+      <p:sp>
+        <p:nvSpPr>
+          <p:cNvPr id="18" name="Oval 17"/>
+          <p:cNvSpPr/>
+          <p:nvPr/>
+        </p:nvSpPr>
+        <p:spPr>
+          <a:xfrm>
+            <a:off x="4952078" y="594394"/>
+            <a:ext cx="1663547" cy="1278735"/>
+          </a:xfrm>
+          <a:prstGeom prst="ellipse">
+            <a:avLst/>
+          </a:prstGeom>
+          <a:solidFill>
+            <a:schemeClr val="accent1">
+              <a:alpha val="25000"/>
+            </a:schemeClr>
+          </a:solidFill>
+          <a:ln>
+            <a:solidFill>
+              <a:schemeClr val="accent1">
+                <a:shade val="50000"/>
+                <a:alpha val="25000"/>
+              </a:schemeClr>
+            </a:solidFill>
+          </a:ln>
+        </p:spPr>
+        <p:style>
+          <a:lnRef idx="2">
+            <a:schemeClr val="accent1">
+              <a:shade val="50000"/>
+            </a:schemeClr>
+          </a:lnRef>
+          <a:fillRef idx="1">
+            <a:schemeClr val="accent1"/>
+          </a:fillRef>
+          <a:effectRef idx="0">
+            <a:schemeClr val="accent1"/>
+          </a:effectRef>
+          <a:fontRef idx="minor">
+            <a:schemeClr val="lt1"/>
+          </a:fontRef>
+        </p:style>
+        <p:txBody>
+          <a:bodyPr rtlCol="0" anchor="ctr"/>
+          <a:lstStyle/>
+          <a:p>
+            <a:pPr algn="ctr"/>
+            <a:endParaRPr lang="en-US"/>
+          </a:p>
+        </p:txBody>
+      </p:sp>
+      <p:sp>
+        <p:nvSpPr>
+          <p:cNvPr id="10" name="Oval 9"/>
+          <p:cNvSpPr/>
+          <p:nvPr/>
+        </p:nvSpPr>
+        <p:spPr>
+          <a:xfrm>
+            <a:off x="5078772" y="2804403"/>
+            <a:ext cx="1663547" cy="1278735"/>
+          </a:xfrm>
+          <a:prstGeom prst="ellipse">
+            <a:avLst/>
+          </a:prstGeom>
+          <a:solidFill>
+            <a:schemeClr val="accent1">
+              <a:alpha val="25000"/>
+            </a:schemeClr>
+          </a:solidFill>
+          <a:ln>
+            <a:solidFill>
+              <a:schemeClr val="accent1">
+                <a:shade val="50000"/>
+                <a:alpha val="25000"/>
+              </a:schemeClr>
+            </a:solidFill>
+          </a:ln>
+        </p:spPr>
+        <p:style>
+          <a:lnRef idx="2">
+            <a:schemeClr val="accent1">
+              <a:shade val="50000"/>
+            </a:schemeClr>
+          </a:lnRef>
+          <a:fillRef idx="1">
+            <a:schemeClr val="accent1"/>
+          </a:fillRef>
+          <a:effectRef idx="0">
+            <a:schemeClr val="accent1"/>
+          </a:effectRef>
+          <a:fontRef idx="minor">
+            <a:schemeClr val="lt1"/>
+          </a:fontRef>
+        </p:style>
+        <p:txBody>
+          <a:bodyPr rtlCol="0" anchor="ctr"/>
+          <a:lstStyle/>
+          <a:p>
+            <a:pPr algn="ctr"/>
+            <a:endParaRPr lang="en-US"/>
+          </a:p>
+        </p:txBody>
+      </p:sp>
+      <p:sp>
+        <p:nvSpPr>
+          <p:cNvPr id="2" name="TextBox 1"/>
+          <p:cNvSpPr txBox="1"/>
+          <p:nvPr/>
+        </p:nvSpPr>
+        <p:spPr>
+          <a:xfrm>
+            <a:off x="4230476" y="2966718"/>
+            <a:ext cx="3382179" cy="954107"/>
+          </a:xfrm>
+          <a:prstGeom prst="rect">
+            <a:avLst/>
+          </a:prstGeom>
+          <a:noFill/>
+        </p:spPr>
+        <p:txBody>
+          <a:bodyPr wrap="square" rtlCol="0">
+            <a:spAutoFit/>
+          </a:bodyPr>
+          <a:lstStyle/>
+          <a:p>
+            <a:pPr algn="ctr"/>
+            <a:r>
+              <a:rPr lang="en-US" sz="2800" dirty="0" smtClean="0"/>
+              <a:t>The academic community is broken</a:t>
+            </a:r>
+            <a:endParaRPr lang="en-US" sz="2800" dirty="0"/>
+          </a:p>
+        </p:txBody>
+      </p:sp>
+      <p:sp>
+        <p:nvSpPr>
+          <p:cNvPr id="3" name="TextBox 2"/>
+          <p:cNvSpPr txBox="1"/>
+          <p:nvPr/>
+        </p:nvSpPr>
+        <p:spPr>
+          <a:xfrm>
+            <a:off x="4494879" y="906881"/>
+            <a:ext cx="2577947" cy="923330"/>
+          </a:xfrm>
+          <a:prstGeom prst="rect">
+            <a:avLst/>
+          </a:prstGeom>
+          <a:noFill/>
+        </p:spPr>
+        <p:txBody>
+          <a:bodyPr wrap="square" rtlCol="0">
+            <a:spAutoFit/>
+          </a:bodyPr>
+          <a:lstStyle/>
+          <a:p>
+            <a:pPr algn="ctr"/>
+            <a:r>
+              <a:rPr lang="en-US" dirty="0"/>
+              <a:t>Academia has a huge money problem</a:t>
+            </a:r>
+          </a:p>
+          <a:p>
+            <a:endParaRPr lang="en-US" dirty="0"/>
+          </a:p>
+        </p:txBody>
+      </p:sp>
+      <p:sp>
+        <p:nvSpPr>
+          <p:cNvPr id="4" name="TextBox 3"/>
+          <p:cNvSpPr txBox="1"/>
+          <p:nvPr/>
+        </p:nvSpPr>
+        <p:spPr>
+          <a:xfrm>
+            <a:off x="7634688" y="1760611"/>
+            <a:ext cx="3040655" cy="646331"/>
+          </a:xfrm>
+          <a:prstGeom prst="rect">
+            <a:avLst/>
+          </a:prstGeom>
+          <a:noFill/>
+        </p:spPr>
+        <p:txBody>
+          <a:bodyPr wrap="square" rtlCol="0">
+            <a:spAutoFit/>
+          </a:bodyPr>
+          <a:lstStyle/>
+          <a:p>
+            <a:pPr algn="ctr"/>
+            <a:r>
+              <a:rPr lang="en-US" dirty="0"/>
+              <a:t>Too many studies are poorly </a:t>
+            </a:r>
+            <a:r>
+              <a:rPr lang="en-US" dirty="0" smtClean="0"/>
+              <a:t>designed</a:t>
+            </a:r>
+            <a:endParaRPr lang="en-US" dirty="0"/>
+          </a:p>
+        </p:txBody>
+      </p:sp>
+      <p:sp>
+        <p:nvSpPr>
+          <p:cNvPr id="5" name="TextBox 4"/>
+          <p:cNvSpPr txBox="1"/>
+          <p:nvPr/>
+        </p:nvSpPr>
+        <p:spPr>
+          <a:xfrm>
+            <a:off x="8328752" y="3895251"/>
+            <a:ext cx="3205908" cy="646331"/>
+          </a:xfrm>
+          <a:prstGeom prst="rect">
+            <a:avLst/>
+          </a:prstGeom>
+          <a:noFill/>
+        </p:spPr>
+        <p:txBody>
+          <a:bodyPr wrap="square" rtlCol="0">
+            <a:spAutoFit/>
+          </a:bodyPr>
+          <a:lstStyle/>
+          <a:p>
+            <a:pPr algn="ctr"/>
+            <a:r>
+              <a:rPr lang="en-US" dirty="0"/>
+              <a:t>Scientists rarely replicate experimental </a:t>
+            </a:r>
+            <a:r>
+              <a:rPr lang="en-US" dirty="0" smtClean="0"/>
+              <a:t>results</a:t>
+            </a:r>
+            <a:endParaRPr lang="en-US" dirty="0"/>
+          </a:p>
+        </p:txBody>
+      </p:sp>
+      <p:sp>
+        <p:nvSpPr>
+          <p:cNvPr id="6" name="TextBox 5"/>
+          <p:cNvSpPr txBox="1"/>
+          <p:nvPr/>
+        </p:nvSpPr>
+        <p:spPr>
+          <a:xfrm>
+            <a:off x="6070293" y="5390524"/>
+            <a:ext cx="3409720" cy="646331"/>
+          </a:xfrm>
+          <a:prstGeom prst="rect">
+            <a:avLst/>
+          </a:prstGeom>
+          <a:noFill/>
+        </p:spPr>
+        <p:txBody>
+          <a:bodyPr wrap="square" rtlCol="0">
+            <a:spAutoFit/>
+          </a:bodyPr>
+          <a:lstStyle/>
+          <a:p>
+            <a:pPr algn="ctr"/>
+            <a:r>
+              <a:rPr lang="en-US" dirty="0"/>
+              <a:t>Peer review doesn't work the way it's supposed </a:t>
+            </a:r>
+            <a:r>
+              <a:rPr lang="en-US" dirty="0" smtClean="0"/>
+              <a:t>to</a:t>
+            </a:r>
+            <a:endParaRPr lang="en-US" dirty="0"/>
+          </a:p>
+        </p:txBody>
+      </p:sp>
+      <p:sp>
+        <p:nvSpPr>
+          <p:cNvPr id="7" name="TextBox 6"/>
+          <p:cNvSpPr txBox="1"/>
+          <p:nvPr/>
+        </p:nvSpPr>
+        <p:spPr>
+          <a:xfrm>
+            <a:off x="2330063" y="5390523"/>
+            <a:ext cx="3580482" cy="646331"/>
+          </a:xfrm>
+          <a:prstGeom prst="rect">
+            <a:avLst/>
+          </a:prstGeom>
+          <a:noFill/>
+        </p:spPr>
+        <p:txBody>
+          <a:bodyPr wrap="square" rtlCol="0">
+            <a:spAutoFit/>
+          </a:bodyPr>
+          <a:lstStyle/>
+          <a:p>
+            <a:pPr algn="ctr"/>
+            <a:r>
+              <a:rPr lang="en-US" dirty="0"/>
+              <a:t>Scientific journal paywalls make reading results expensive</a:t>
+            </a:r>
+          </a:p>
+        </p:txBody>
+      </p:sp>
+      <p:sp>
+        <p:nvSpPr>
+          <p:cNvPr id="8" name="TextBox 7"/>
+          <p:cNvSpPr txBox="1"/>
+          <p:nvPr/>
+        </p:nvSpPr>
+        <p:spPr>
+          <a:xfrm>
+            <a:off x="782197" y="3591499"/>
+            <a:ext cx="2754217" cy="923330"/>
+          </a:xfrm>
+          <a:prstGeom prst="rect">
+            <a:avLst/>
+          </a:prstGeom>
+          <a:noFill/>
+        </p:spPr>
+        <p:txBody>
+          <a:bodyPr wrap="square" rtlCol="0">
+            <a:spAutoFit/>
+          </a:bodyPr>
+          <a:lstStyle/>
+          <a:p>
+            <a:pPr algn="ctr"/>
+            <a:r>
+              <a:rPr lang="en-US" dirty="0"/>
+              <a:t>Science is often poorly communicated to the </a:t>
+            </a:r>
+            <a:r>
+              <a:rPr lang="en-US" dirty="0" smtClean="0"/>
+              <a:t>public</a:t>
+            </a:r>
+            <a:endParaRPr lang="en-US" dirty="0"/>
+          </a:p>
+        </p:txBody>
+      </p:sp>
+      <p:sp>
+        <p:nvSpPr>
+          <p:cNvPr id="9" name="TextBox 8"/>
+          <p:cNvSpPr txBox="1"/>
+          <p:nvPr/>
+        </p:nvSpPr>
+        <p:spPr>
+          <a:xfrm>
+            <a:off x="1448715" y="1852138"/>
+            <a:ext cx="2644049" cy="646331"/>
+          </a:xfrm>
+          <a:prstGeom prst="rect">
+            <a:avLst/>
+          </a:prstGeom>
+          <a:noFill/>
+        </p:spPr>
+        <p:txBody>
+          <a:bodyPr wrap="square" rtlCol="0">
+            <a:spAutoFit/>
+          </a:bodyPr>
+          <a:lstStyle/>
+          <a:p>
+            <a:pPr algn="ctr"/>
+            <a:r>
+              <a:rPr lang="en-US" dirty="0"/>
+              <a:t>It's very hard to be a young </a:t>
+            </a:r>
+            <a:r>
+              <a:rPr lang="en-US" dirty="0" smtClean="0"/>
+              <a:t>scientist</a:t>
+            </a:r>
+            <a:endParaRPr lang="en-US" dirty="0"/>
+          </a:p>
+        </p:txBody>
+      </p:sp>
+    </p:spTree>
+    <p:extLst>
+      <p:ext uri="{BB962C8B-B14F-4D97-AF65-F5344CB8AC3E}">
+        <p14:creationId xmlns:p14="http://schemas.microsoft.com/office/powerpoint/2010/main" val="4267268618"/>
+      </p:ext>
+    </p:extLst>
+  </p:cSld>
+  <p:clrMapOvr>
+    <a:masterClrMapping/>
+  </p:clrMapOvr>
+</p:sld>
+</file>
+
+<file path=ppt/slides/slide4.xml><?xml version="1.0" encoding="utf-8"?>
+<p:sld xmlns:a="http://schemas.openxmlformats.org/drawingml/2006/main" xmlns:r="http://schemas.openxmlformats.org/officeDocument/2006/relationships" xmlns:p="http://schemas.openxmlformats.org/presentationml/2006/main">
+  <p:cSld>
+    <p:spTree>
+      <p:nvGrpSpPr>
+        <p:cNvPr id="1" name=""/>
+        <p:cNvGrpSpPr/>
+        <p:nvPr/>
+      </p:nvGrpSpPr>
+      <p:grpSpPr>
+        <a:xfrm>
+          <a:off x="0" y="0"/>
+          <a:ext cx="0" cy="0"/>
+          <a:chOff x="0" y="0"/>
+          <a:chExt cx="0" cy="0"/>
+        </a:xfrm>
+      </p:grpSpPr>
+      <p:sp>
+        <p:nvSpPr>
+          <p:cNvPr id="3" name="Oval 2"/>
+          <p:cNvSpPr/>
+          <p:nvPr/>
+        </p:nvSpPr>
+        <p:spPr>
+          <a:xfrm>
+            <a:off x="2765234" y="2599982"/>
+            <a:ext cx="6433850" cy="1311006"/>
+          </a:xfrm>
+          <a:prstGeom prst="ellipse">
+            <a:avLst/>
+          </a:prstGeom>
+          <a:solidFill>
+            <a:schemeClr val="accent1">
+              <a:alpha val="25000"/>
+            </a:schemeClr>
+          </a:solidFill>
+          <a:ln>
+            <a:solidFill>
+              <a:schemeClr val="accent1">
+                <a:shade val="50000"/>
+                <a:alpha val="25000"/>
+              </a:schemeClr>
+            </a:solidFill>
+          </a:ln>
+        </p:spPr>
+        <p:style>
+          <a:lnRef idx="2">
+            <a:schemeClr val="accent1">
+              <a:shade val="50000"/>
+            </a:schemeClr>
+          </a:lnRef>
+          <a:fillRef idx="1">
+            <a:schemeClr val="accent1"/>
+          </a:fillRef>
+          <a:effectRef idx="0">
+            <a:schemeClr val="accent1"/>
+          </a:effectRef>
+          <a:fontRef idx="minor">
+            <a:schemeClr val="lt1"/>
+          </a:fontRef>
+        </p:style>
+        <p:txBody>
+          <a:bodyPr rtlCol="0" anchor="ctr"/>
+          <a:lstStyle/>
+          <a:p>
+            <a:pPr algn="ctr"/>
+            <a:endParaRPr lang="en-US"/>
+          </a:p>
+        </p:txBody>
+      </p:sp>
+      <p:sp>
+        <p:nvSpPr>
+          <p:cNvPr id="2" name="TextBox 1"/>
+          <p:cNvSpPr txBox="1"/>
+          <p:nvPr/>
+        </p:nvSpPr>
+        <p:spPr>
+          <a:xfrm>
+            <a:off x="3200399" y="2599982"/>
+            <a:ext cx="5574536" cy="1077218"/>
+          </a:xfrm>
+          <a:prstGeom prst="rect">
+            <a:avLst/>
+          </a:prstGeom>
+          <a:noFill/>
+        </p:spPr>
+        <p:txBody>
+          <a:bodyPr wrap="square" rtlCol="0">
+            <a:spAutoFit/>
+          </a:bodyPr>
+          <a:lstStyle/>
+          <a:p>
+            <a:pPr algn="ctr"/>
+            <a:r>
+              <a:rPr lang="en-US" sz="3200" dirty="0" smtClean="0"/>
+              <a:t>Something like methodocracy.org doesn’t exist</a:t>
+            </a:r>
+            <a:endParaRPr lang="en-US" sz="3200" dirty="0"/>
+          </a:p>
+        </p:txBody>
+      </p:sp>
+    </p:spTree>
+    <p:extLst>
+      <p:ext uri="{BB962C8B-B14F-4D97-AF65-F5344CB8AC3E}">
+        <p14:creationId xmlns:p14="http://schemas.microsoft.com/office/powerpoint/2010/main" val="1740714237"/>
+      </p:ext>
+    </p:extLst>
+  </p:cSld>
+  <p:clrMapOvr>
+    <a:masterClrMapping/>
+  </p:clrMapOvr>
+</p:sld>
+</file>
+
+<file path=ppt/slides/slide5.xml><?xml version="1.0" encoding="utf-8"?>
+<p:sld xmlns:a="http://schemas.openxmlformats.org/drawingml/2006/main" xmlns:r="http://schemas.openxmlformats.org/officeDocument/2006/relationships" xmlns:p="http://schemas.openxmlformats.org/presentationml/2006/main">
+  <p:cSld>
+    <p:spTree>
+      <p:nvGrpSpPr>
+        <p:cNvPr id="1" name=""/>
+        <p:cNvGrpSpPr/>
+        <p:nvPr/>
+      </p:nvGrpSpPr>
+      <p:grpSpPr>
+        <a:xfrm>
+          <a:off x="0" y="0"/>
+          <a:ext cx="0" cy="0"/>
+          <a:chOff x="0" y="0"/>
+          <a:chExt cx="0" cy="0"/>
+        </a:xfrm>
+      </p:grpSpPr>
+      <p:cxnSp>
+        <p:nvCxnSpPr>
+          <p:cNvPr id="10" name="Straight Connector 9"/>
+          <p:cNvCxnSpPr/>
+          <p:nvPr/>
+        </p:nvCxnSpPr>
+        <p:spPr>
+          <a:xfrm>
+            <a:off x="4358107" y="2000964"/>
+            <a:ext cx="748300" cy="1086922"/>
+          </a:xfrm>
+          <a:prstGeom prst="line">
+            <a:avLst/>
+          </a:prstGeom>
+          <a:ln w="31750"/>
+        </p:spPr>
+        <p:style>
+          <a:lnRef idx="1">
+            <a:schemeClr val="dk1"/>
+          </a:lnRef>
+          <a:fillRef idx="0">
+            <a:schemeClr val="dk1"/>
+          </a:fillRef>
+          <a:effectRef idx="0">
+            <a:schemeClr val="dk1"/>
+          </a:effectRef>
+          <a:fontRef idx="minor">
+            <a:schemeClr val="tx1"/>
+          </a:fontRef>
+        </p:style>
+      </p:cxnSp>
+      <p:cxnSp>
+        <p:nvCxnSpPr>
+          <p:cNvPr id="11" name="Straight Connector 10"/>
+          <p:cNvCxnSpPr/>
+          <p:nvPr/>
+        </p:nvCxnSpPr>
+        <p:spPr>
+          <a:xfrm flipV="1">
+            <a:off x="6531077" y="2825305"/>
+            <a:ext cx="1070561" cy="406168"/>
+          </a:xfrm>
+          <a:prstGeom prst="line">
+            <a:avLst/>
+          </a:prstGeom>
+          <a:ln w="31750"/>
+        </p:spPr>
+        <p:style>
+          <a:lnRef idx="1">
+            <a:schemeClr val="dk1"/>
+          </a:lnRef>
+          <a:fillRef idx="0">
+            <a:schemeClr val="dk1"/>
+          </a:fillRef>
+          <a:effectRef idx="0">
+            <a:schemeClr val="dk1"/>
+          </a:effectRef>
+          <a:fontRef idx="minor">
+            <a:schemeClr val="tx1"/>
+          </a:fontRef>
+        </p:style>
+      </p:cxnSp>
+      <p:cxnSp>
+        <p:nvCxnSpPr>
+          <p:cNvPr id="12" name="Straight Connector 11"/>
+          <p:cNvCxnSpPr/>
+          <p:nvPr/>
+        </p:nvCxnSpPr>
+        <p:spPr>
+          <a:xfrm flipH="1">
+            <a:off x="4358107" y="3701503"/>
+            <a:ext cx="862898" cy="1110782"/>
+          </a:xfrm>
+          <a:prstGeom prst="line">
+            <a:avLst/>
+          </a:prstGeom>
+          <a:ln w="31750"/>
+        </p:spPr>
+        <p:style>
+          <a:lnRef idx="1">
+            <a:schemeClr val="dk1"/>
+          </a:lnRef>
+          <a:fillRef idx="0">
+            <a:schemeClr val="dk1"/>
+          </a:fillRef>
+          <a:effectRef idx="0">
+            <a:schemeClr val="dk1"/>
+          </a:effectRef>
+          <a:fontRef idx="minor">
+            <a:schemeClr val="tx1"/>
+          </a:fontRef>
+        </p:style>
+      </p:cxnSp>
+      <p:sp>
+        <p:nvSpPr>
+          <p:cNvPr id="6" name="Oval 5"/>
+          <p:cNvSpPr/>
+          <p:nvPr/>
+        </p:nvSpPr>
+        <p:spPr>
+          <a:xfrm>
+            <a:off x="4549966" y="2936958"/>
+            <a:ext cx="2192357" cy="947890"/>
+          </a:xfrm>
+          <a:prstGeom prst="ellipse">
+            <a:avLst/>
+          </a:prstGeom>
+          <a:solidFill>
+            <a:schemeClr val="accent1">
+              <a:alpha val="25000"/>
+            </a:schemeClr>
+          </a:solidFill>
+          <a:ln>
+            <a:solidFill>
+              <a:schemeClr val="accent1">
+                <a:shade val="50000"/>
+                <a:alpha val="25000"/>
+              </a:schemeClr>
+            </a:solidFill>
+          </a:ln>
+        </p:spPr>
+        <p:style>
+          <a:lnRef idx="2">
+            <a:schemeClr val="accent1">
+              <a:shade val="50000"/>
+            </a:schemeClr>
+          </a:lnRef>
+          <a:fillRef idx="1">
+            <a:schemeClr val="accent1"/>
+          </a:fillRef>
+          <a:effectRef idx="0">
+            <a:schemeClr val="accent1"/>
+          </a:effectRef>
+          <a:fontRef idx="minor">
+            <a:schemeClr val="lt1"/>
+          </a:fontRef>
+        </p:style>
+        <p:txBody>
+          <a:bodyPr rtlCol="0" anchor="ctr"/>
+          <a:lstStyle/>
+          <a:p>
+            <a:pPr algn="ctr"/>
+            <a:endParaRPr lang="en-US"/>
+          </a:p>
+        </p:txBody>
+      </p:sp>
+      <p:sp>
+        <p:nvSpPr>
+          <p:cNvPr id="7" name="Oval 6"/>
+          <p:cNvSpPr/>
+          <p:nvPr/>
+        </p:nvSpPr>
+        <p:spPr>
+          <a:xfrm>
+            <a:off x="1683745" y="1126251"/>
+            <a:ext cx="3945875" cy="947890"/>
+          </a:xfrm>
+          <a:prstGeom prst="ellipse">
+            <a:avLst/>
+          </a:prstGeom>
+          <a:solidFill>
+            <a:schemeClr val="accent1">
+              <a:alpha val="25000"/>
+            </a:schemeClr>
+          </a:solidFill>
+          <a:ln>
+            <a:solidFill>
+              <a:schemeClr val="accent1">
+                <a:shade val="50000"/>
+                <a:alpha val="25000"/>
+              </a:schemeClr>
+            </a:solidFill>
+          </a:ln>
+        </p:spPr>
+        <p:style>
+          <a:lnRef idx="2">
+            <a:schemeClr val="accent1">
+              <a:shade val="50000"/>
+            </a:schemeClr>
+          </a:lnRef>
+          <a:fillRef idx="1">
+            <a:schemeClr val="accent1"/>
+          </a:fillRef>
+          <a:effectRef idx="0">
+            <a:schemeClr val="accent1"/>
+          </a:effectRef>
+          <a:fontRef idx="minor">
+            <a:schemeClr val="lt1"/>
+          </a:fontRef>
+        </p:style>
+        <p:txBody>
+          <a:bodyPr rtlCol="0" anchor="ctr"/>
+          <a:lstStyle/>
+          <a:p>
+            <a:pPr algn="ctr"/>
+            <a:endParaRPr lang="en-US"/>
+          </a:p>
+        </p:txBody>
+      </p:sp>
+      <p:sp>
+        <p:nvSpPr>
+          <p:cNvPr id="8" name="Oval 7"/>
+          <p:cNvSpPr/>
+          <p:nvPr/>
+        </p:nvSpPr>
+        <p:spPr>
+          <a:xfrm>
+            <a:off x="7432713" y="2427213"/>
+            <a:ext cx="3496019" cy="635476"/>
+          </a:xfrm>
+          <a:prstGeom prst="ellipse">
+            <a:avLst/>
+          </a:prstGeom>
+          <a:solidFill>
+            <a:schemeClr val="accent1">
+              <a:alpha val="25000"/>
+            </a:schemeClr>
+          </a:solidFill>
+          <a:ln>
+            <a:solidFill>
+              <a:schemeClr val="accent1">
+                <a:shade val="50000"/>
+                <a:alpha val="25000"/>
+              </a:schemeClr>
+            </a:solidFill>
+          </a:ln>
+        </p:spPr>
+        <p:style>
+          <a:lnRef idx="2">
+            <a:schemeClr val="accent1">
+              <a:shade val="50000"/>
+            </a:schemeClr>
+          </a:lnRef>
+          <a:fillRef idx="1">
+            <a:schemeClr val="accent1"/>
+          </a:fillRef>
+          <a:effectRef idx="0">
+            <a:schemeClr val="accent1"/>
+          </a:effectRef>
+          <a:fontRef idx="minor">
+            <a:schemeClr val="lt1"/>
+          </a:fontRef>
+        </p:style>
+        <p:txBody>
+          <a:bodyPr rtlCol="0" anchor="ctr"/>
+          <a:lstStyle/>
+          <a:p>
+            <a:pPr algn="ctr"/>
+            <a:endParaRPr lang="en-US"/>
+          </a:p>
+        </p:txBody>
+      </p:sp>
+      <p:sp>
+        <p:nvSpPr>
+          <p:cNvPr id="9" name="Oval 8"/>
+          <p:cNvSpPr/>
+          <p:nvPr/>
+        </p:nvSpPr>
+        <p:spPr>
+          <a:xfrm>
+            <a:off x="2203373" y="4662592"/>
+            <a:ext cx="3866921" cy="1341599"/>
+          </a:xfrm>
+          <a:prstGeom prst="ellipse">
+            <a:avLst/>
+          </a:prstGeom>
+          <a:solidFill>
+            <a:schemeClr val="accent1">
+              <a:alpha val="25000"/>
+            </a:schemeClr>
+          </a:solidFill>
+          <a:ln>
+            <a:solidFill>
+              <a:schemeClr val="accent1">
+                <a:shade val="50000"/>
+                <a:alpha val="25000"/>
+              </a:schemeClr>
+            </a:solidFill>
+          </a:ln>
+        </p:spPr>
+        <p:style>
+          <a:lnRef idx="2">
+            <a:schemeClr val="accent1">
+              <a:shade val="50000"/>
+            </a:schemeClr>
+          </a:lnRef>
+          <a:fillRef idx="1">
+            <a:schemeClr val="accent1"/>
+          </a:fillRef>
+          <a:effectRef idx="0">
+            <a:schemeClr val="accent1"/>
+          </a:effectRef>
+          <a:fontRef idx="minor">
+            <a:schemeClr val="lt1"/>
+          </a:fontRef>
+        </p:style>
+        <p:txBody>
+          <a:bodyPr rtlCol="0" anchor="ctr"/>
+          <a:lstStyle/>
+          <a:p>
+            <a:pPr algn="ctr"/>
+            <a:endParaRPr lang="en-US"/>
+          </a:p>
+        </p:txBody>
+      </p:sp>
+      <p:sp>
+        <p:nvSpPr>
+          <p:cNvPr id="2" name="TextBox 1"/>
+          <p:cNvSpPr txBox="1"/>
+          <p:nvPr/>
+        </p:nvSpPr>
+        <p:spPr>
+          <a:xfrm>
+            <a:off x="4979624" y="3062689"/>
+            <a:ext cx="1762699" cy="584775"/>
+          </a:xfrm>
+          <a:prstGeom prst="rect">
+            <a:avLst/>
+          </a:prstGeom>
+          <a:noFill/>
+        </p:spPr>
+        <p:txBody>
+          <a:bodyPr wrap="square" rtlCol="0">
+            <a:spAutoFit/>
+          </a:bodyPr>
+          <a:lstStyle/>
+          <a:p>
+            <a:r>
+              <a:rPr lang="en-US" sz="3200" dirty="0" smtClean="0"/>
+              <a:t>Solution</a:t>
+            </a:r>
+            <a:endParaRPr lang="en-US" sz="3200" dirty="0"/>
+          </a:p>
+        </p:txBody>
+      </p:sp>
+      <p:sp>
+        <p:nvSpPr>
+          <p:cNvPr id="3" name="TextBox 2"/>
+          <p:cNvSpPr txBox="1"/>
+          <p:nvPr/>
+        </p:nvSpPr>
+        <p:spPr>
+          <a:xfrm>
+            <a:off x="1861850" y="1277031"/>
+            <a:ext cx="3668617" cy="646331"/>
+          </a:xfrm>
+          <a:prstGeom prst="rect">
+            <a:avLst/>
+          </a:prstGeom>
+          <a:noFill/>
+        </p:spPr>
+        <p:txBody>
+          <a:bodyPr wrap="square" rtlCol="0">
+            <a:spAutoFit/>
+          </a:bodyPr>
+          <a:lstStyle/>
+          <a:p>
+            <a:pPr algn="ctr"/>
+            <a:r>
+              <a:rPr lang="en-US" dirty="0" smtClean="0"/>
+              <a:t>Connecting research </a:t>
+            </a:r>
+            <a:r>
+              <a:rPr lang="en-US" dirty="0"/>
+              <a:t>together into the larger debate</a:t>
+            </a:r>
+            <a:r>
+              <a:rPr lang="en-US" dirty="0" smtClean="0"/>
+              <a:t>.</a:t>
+            </a:r>
+            <a:endParaRPr lang="en-US" dirty="0"/>
+          </a:p>
+        </p:txBody>
+      </p:sp>
+      <p:sp>
+        <p:nvSpPr>
+          <p:cNvPr id="4" name="TextBox 3"/>
+          <p:cNvSpPr txBox="1"/>
+          <p:nvPr/>
+        </p:nvSpPr>
+        <p:spPr>
+          <a:xfrm>
+            <a:off x="7601638" y="2560285"/>
+            <a:ext cx="4219460" cy="369332"/>
+          </a:xfrm>
+          <a:prstGeom prst="rect">
+            <a:avLst/>
+          </a:prstGeom>
+          <a:noFill/>
+        </p:spPr>
+        <p:txBody>
+          <a:bodyPr wrap="square" rtlCol="0">
+            <a:spAutoFit/>
+          </a:bodyPr>
+          <a:lstStyle/>
+          <a:p>
+            <a:r>
+              <a:rPr lang="en-US" dirty="0" smtClean="0"/>
+              <a:t>Involving the general population.</a:t>
+            </a:r>
+            <a:endParaRPr lang="en-US" dirty="0"/>
+          </a:p>
+        </p:txBody>
+      </p:sp>
+      <p:sp>
+        <p:nvSpPr>
+          <p:cNvPr id="5" name="TextBox 4"/>
+          <p:cNvSpPr txBox="1"/>
+          <p:nvPr/>
+        </p:nvSpPr>
+        <p:spPr>
+          <a:xfrm>
+            <a:off x="2203373" y="4946573"/>
+            <a:ext cx="3866921" cy="923330"/>
+          </a:xfrm>
+          <a:prstGeom prst="rect">
+            <a:avLst/>
+          </a:prstGeom>
+          <a:noFill/>
+        </p:spPr>
+        <p:txBody>
+          <a:bodyPr wrap="square" rtlCol="0">
+            <a:spAutoFit/>
+          </a:bodyPr>
+          <a:lstStyle/>
+          <a:p>
+            <a:pPr algn="ctr"/>
+            <a:r>
+              <a:rPr lang="en-US" dirty="0" smtClean="0"/>
+              <a:t>Hosting bill drafting for public policy and proposal drafting for the private sector.</a:t>
+            </a:r>
+            <a:endParaRPr lang="en-US" dirty="0"/>
+          </a:p>
+        </p:txBody>
+      </p:sp>
+    </p:spTree>
+    <p:extLst>
+      <p:ext uri="{BB962C8B-B14F-4D97-AF65-F5344CB8AC3E}">
+        <p14:creationId xmlns:p14="http://schemas.microsoft.com/office/powerpoint/2010/main" val="94219351"/>
+      </p:ext>
+    </p:extLst>
+  </p:cSld>
+  <p:clrMapOvr>
+    <a:masterClrMapping/>
+  </p:clrMapOvr>
+</p:sld>
+</file>
+
+<file path=ppt/slides/slide6.xml><?xml version="1.0" encoding="utf-8"?>
+<p:sld xmlns:a="http://schemas.openxmlformats.org/drawingml/2006/main" xmlns:r="http://schemas.openxmlformats.org/officeDocument/2006/relationships" xmlns:p="http://schemas.openxmlformats.org/presentationml/2006/main">
+  <p:cSld>
+    <p:spTree>
+      <p:nvGrpSpPr>
+        <p:cNvPr id="1" name=""/>
+        <p:cNvGrpSpPr/>
+        <p:nvPr/>
+      </p:nvGrpSpPr>
+      <p:grpSpPr>
+        <a:xfrm>
+          <a:off x="0" y="0"/>
+          <a:ext cx="0" cy="0"/>
+          <a:chOff x="0" y="0"/>
+          <a:chExt cx="0" cy="0"/>
+        </a:xfrm>
+      </p:grpSpPr>
+      <p:pic>
+        <p:nvPicPr>
+          <p:cNvPr id="2" name="Picture 1"/>
+          <p:cNvPicPr>
+            <a:picLocks noChangeAspect="1"/>
+          </p:cNvPicPr>
+          <p:nvPr/>
+        </p:nvPicPr>
+        <p:blipFill>
+          <a:blip r:embed="rId2">
+            <a:extLst>
+              <a:ext uri="{28A0092B-C50C-407E-A947-70E740481C1C}">
+                <a14:useLocalDpi xmlns:a14="http://schemas.microsoft.com/office/drawing/2010/main" val="0"/>
+              </a:ext>
+            </a:extLst>
+          </a:blip>
+          <a:stretch>
+            <a:fillRect/>
+          </a:stretch>
+        </p:blipFill>
+        <p:spPr>
+          <a:xfrm>
+            <a:off x="7005480" y="1831981"/>
+            <a:ext cx="4725059" cy="4582164"/>
+          </a:xfrm>
+          <a:prstGeom prst="rect">
+            <a:avLst/>
+          </a:prstGeom>
+        </p:spPr>
+      </p:pic>
+      <p:sp>
+        <p:nvSpPr>
+          <p:cNvPr id="3" name="TextBox 2"/>
+          <p:cNvSpPr txBox="1"/>
+          <p:nvPr/>
+        </p:nvSpPr>
+        <p:spPr>
+          <a:xfrm>
+            <a:off x="738130" y="793214"/>
+            <a:ext cx="4935557" cy="2554545"/>
+          </a:xfrm>
+          <a:prstGeom prst="rect">
+            <a:avLst/>
+          </a:prstGeom>
+          <a:noFill/>
+        </p:spPr>
+        <p:txBody>
+          <a:bodyPr wrap="square" rtlCol="0">
+            <a:spAutoFit/>
+          </a:bodyPr>
+          <a:lstStyle/>
+          <a:p>
+            <a:r>
+              <a:rPr lang="en-US" sz="3200" dirty="0" smtClean="0"/>
+              <a:t>Product:</a:t>
+            </a:r>
+          </a:p>
+          <a:p>
+            <a:r>
+              <a:rPr lang="en-US" sz="3200" dirty="0" smtClean="0"/>
+              <a:t>Users enter entries into the knowledge base and form connections between other entries. AI helps.</a:t>
+            </a:r>
+            <a:endParaRPr lang="en-US" sz="3200" dirty="0"/>
+          </a:p>
+        </p:txBody>
+      </p:sp>
+      <p:sp>
+        <p:nvSpPr>
+          <p:cNvPr id="4" name="TextBox 3"/>
+          <p:cNvSpPr txBox="1"/>
+          <p:nvPr/>
+        </p:nvSpPr>
+        <p:spPr>
+          <a:xfrm>
+            <a:off x="3668616" y="3988106"/>
+            <a:ext cx="1894902" cy="1569660"/>
+          </a:xfrm>
+          <a:prstGeom prst="rect">
+            <a:avLst/>
+          </a:prstGeom>
+          <a:noFill/>
+        </p:spPr>
+        <p:txBody>
+          <a:bodyPr wrap="square" rtlCol="0">
+            <a:spAutoFit/>
+          </a:bodyPr>
+          <a:lstStyle/>
+          <a:p>
+            <a:r>
+              <a:rPr lang="en-US" sz="3200" dirty="0" smtClean="0"/>
+              <a:t>#1</a:t>
+            </a:r>
+          </a:p>
+          <a:p>
+            <a:endParaRPr lang="en-US" sz="3200" dirty="0"/>
+          </a:p>
+          <a:p>
+            <a:r>
+              <a:rPr lang="en-US" sz="3200" dirty="0" smtClean="0"/>
+              <a:t>#2</a:t>
+            </a:r>
+            <a:endParaRPr lang="en-US" sz="3200" dirty="0"/>
+          </a:p>
+        </p:txBody>
+      </p:sp>
+      <p:sp>
+        <p:nvSpPr>
+          <p:cNvPr id="9" name="Freeform 8"/>
+          <p:cNvSpPr/>
+          <p:nvPr/>
+        </p:nvSpPr>
+        <p:spPr>
+          <a:xfrm>
+            <a:off x="4461831" y="3646583"/>
+            <a:ext cx="2743200" cy="661012"/>
+          </a:xfrm>
+          <a:custGeom>
+            <a:avLst/>
+            <a:gdLst>
+              <a:gd name="connsiteX0" fmla="*/ 0 w 2743200"/>
+              <a:gd name="connsiteY0" fmla="*/ 661012 h 661012"/>
+              <a:gd name="connsiteX1" fmla="*/ 1674564 w 2743200"/>
+              <a:gd name="connsiteY1" fmla="*/ 451692 h 661012"/>
+              <a:gd name="connsiteX2" fmla="*/ 2743200 w 2743200"/>
+              <a:gd name="connsiteY2" fmla="*/ 0 h 661012"/>
+            </a:gdLst>
+            <a:ahLst/>
+            <a:cxnLst>
+              <a:cxn ang="0">
+                <a:pos x="connsiteX0" y="connsiteY0"/>
+              </a:cxn>
+              <a:cxn ang="0">
+                <a:pos x="connsiteX1" y="connsiteY1"/>
+              </a:cxn>
+              <a:cxn ang="0">
+                <a:pos x="connsiteX2" y="connsiteY2"/>
+              </a:cxn>
+            </a:cxnLst>
+            <a:rect l="l" t="t" r="r" b="b"/>
+            <a:pathLst>
+              <a:path w="2743200" h="661012">
+                <a:moveTo>
+                  <a:pt x="0" y="661012"/>
+                </a:moveTo>
+                <a:cubicBezTo>
+                  <a:pt x="608682" y="611436"/>
+                  <a:pt x="1217364" y="561861"/>
+                  <a:pt x="1674564" y="451692"/>
+                </a:cubicBezTo>
+                <a:cubicBezTo>
+                  <a:pt x="2131764" y="341523"/>
+                  <a:pt x="2437482" y="170761"/>
+                  <a:pt x="2743200" y="0"/>
+                </a:cubicBezTo>
+              </a:path>
+            </a:pathLst>
+          </a:custGeom>
+          <a:ln w="19050">
+            <a:solidFill>
+              <a:schemeClr val="dk1"/>
+            </a:solidFill>
+            <a:tailEnd type="stealth" w="lg" len="lg"/>
+          </a:ln>
+        </p:spPr>
+        <p:style>
+          <a:lnRef idx="1">
+            <a:schemeClr val="dk1"/>
+          </a:lnRef>
+          <a:fillRef idx="0">
+            <a:schemeClr val="dk1"/>
+          </a:fillRef>
+          <a:effectRef idx="0">
+            <a:schemeClr val="dk1"/>
+          </a:effectRef>
+          <a:fontRef idx="minor">
+            <a:schemeClr val="tx1"/>
+          </a:fontRef>
+        </p:style>
+        <p:txBody>
+          <a:bodyPr rtlCol="0" anchor="ctr"/>
+          <a:lstStyle/>
+          <a:p>
+            <a:pPr algn="ctr"/>
+            <a:endParaRPr lang="en-US"/>
+          </a:p>
+        </p:txBody>
+      </p:sp>
+      <p:sp>
+        <p:nvSpPr>
+          <p:cNvPr id="10" name="Freeform 9"/>
+          <p:cNvSpPr/>
+          <p:nvPr/>
+        </p:nvSpPr>
+        <p:spPr>
+          <a:xfrm rot="18763946" flipV="1">
+            <a:off x="4213950" y="3529586"/>
+            <a:ext cx="3835268" cy="1003344"/>
+          </a:xfrm>
+          <a:custGeom>
+            <a:avLst/>
+            <a:gdLst>
+              <a:gd name="connsiteX0" fmla="*/ 0 w 2743200"/>
+              <a:gd name="connsiteY0" fmla="*/ 661012 h 661012"/>
+              <a:gd name="connsiteX1" fmla="*/ 1674564 w 2743200"/>
+              <a:gd name="connsiteY1" fmla="*/ 451692 h 661012"/>
+              <a:gd name="connsiteX2" fmla="*/ 2743200 w 2743200"/>
+              <a:gd name="connsiteY2" fmla="*/ 0 h 661012"/>
+            </a:gdLst>
+            <a:ahLst/>
+            <a:cxnLst>
+              <a:cxn ang="0">
+                <a:pos x="connsiteX0" y="connsiteY0"/>
+              </a:cxn>
+              <a:cxn ang="0">
+                <a:pos x="connsiteX1" y="connsiteY1"/>
+              </a:cxn>
+              <a:cxn ang="0">
+                <a:pos x="connsiteX2" y="connsiteY2"/>
+              </a:cxn>
+            </a:cxnLst>
+            <a:rect l="l" t="t" r="r" b="b"/>
+            <a:pathLst>
+              <a:path w="2743200" h="661012">
+                <a:moveTo>
+                  <a:pt x="0" y="661012"/>
+                </a:moveTo>
+                <a:cubicBezTo>
+                  <a:pt x="608682" y="611436"/>
+                  <a:pt x="1217364" y="561861"/>
+                  <a:pt x="1674564" y="451692"/>
+                </a:cubicBezTo>
+                <a:cubicBezTo>
+                  <a:pt x="2131764" y="341523"/>
+                  <a:pt x="2437482" y="170761"/>
+                  <a:pt x="2743200" y="0"/>
+                </a:cubicBezTo>
+              </a:path>
+            </a:pathLst>
+          </a:custGeom>
+          <a:ln w="19050">
+            <a:solidFill>
+              <a:schemeClr val="dk1"/>
+            </a:solidFill>
+            <a:tailEnd type="stealth" w="lg" len="lg"/>
+          </a:ln>
+        </p:spPr>
+        <p:style>
+          <a:lnRef idx="1">
+            <a:schemeClr val="dk1"/>
+          </a:lnRef>
+          <a:fillRef idx="0">
+            <a:schemeClr val="dk1"/>
+          </a:fillRef>
+          <a:effectRef idx="0">
+            <a:schemeClr val="dk1"/>
+          </a:effectRef>
+          <a:fontRef idx="minor">
+            <a:schemeClr val="tx1"/>
+          </a:fontRef>
+        </p:style>
+        <p:txBody>
+          <a:bodyPr rtlCol="0" anchor="ctr"/>
+          <a:lstStyle/>
+          <a:p>
+            <a:pPr algn="ctr"/>
+            <a:endParaRPr lang="en-US"/>
+          </a:p>
+        </p:txBody>
+      </p:sp>
+      <p:sp>
+        <p:nvSpPr>
+          <p:cNvPr id="11" name="Freeform 10"/>
+          <p:cNvSpPr/>
+          <p:nvPr/>
+        </p:nvSpPr>
+        <p:spPr>
+          <a:xfrm>
+            <a:off x="4461830" y="3798052"/>
+            <a:ext cx="3489977" cy="1512078"/>
+          </a:xfrm>
+          <a:custGeom>
+            <a:avLst/>
+            <a:gdLst>
+              <a:gd name="connsiteX0" fmla="*/ 0 w 2743200"/>
+              <a:gd name="connsiteY0" fmla="*/ 661012 h 661012"/>
+              <a:gd name="connsiteX1" fmla="*/ 1674564 w 2743200"/>
+              <a:gd name="connsiteY1" fmla="*/ 451692 h 661012"/>
+              <a:gd name="connsiteX2" fmla="*/ 2743200 w 2743200"/>
+              <a:gd name="connsiteY2" fmla="*/ 0 h 661012"/>
+            </a:gdLst>
+            <a:ahLst/>
+            <a:cxnLst>
+              <a:cxn ang="0">
+                <a:pos x="connsiteX0" y="connsiteY0"/>
+              </a:cxn>
+              <a:cxn ang="0">
+                <a:pos x="connsiteX1" y="connsiteY1"/>
+              </a:cxn>
+              <a:cxn ang="0">
+                <a:pos x="connsiteX2" y="connsiteY2"/>
+              </a:cxn>
+            </a:cxnLst>
+            <a:rect l="l" t="t" r="r" b="b"/>
+            <a:pathLst>
+              <a:path w="2743200" h="661012">
+                <a:moveTo>
+                  <a:pt x="0" y="661012"/>
+                </a:moveTo>
+                <a:cubicBezTo>
+                  <a:pt x="608682" y="611436"/>
+                  <a:pt x="1217364" y="561861"/>
+                  <a:pt x="1674564" y="451692"/>
+                </a:cubicBezTo>
+                <a:cubicBezTo>
+                  <a:pt x="2131764" y="341523"/>
+                  <a:pt x="2437482" y="170761"/>
+                  <a:pt x="2743200" y="0"/>
+                </a:cubicBezTo>
+              </a:path>
+            </a:pathLst>
+          </a:custGeom>
+          <a:ln w="19050">
+            <a:solidFill>
+              <a:schemeClr val="dk1"/>
+            </a:solidFill>
+            <a:tailEnd type="stealth" w="lg" len="lg"/>
+          </a:ln>
+        </p:spPr>
+        <p:style>
+          <a:lnRef idx="1">
+            <a:schemeClr val="dk1"/>
+          </a:lnRef>
+          <a:fillRef idx="0">
+            <a:schemeClr val="dk1"/>
+          </a:fillRef>
+          <a:effectRef idx="0">
+            <a:schemeClr val="dk1"/>
+          </a:effectRef>
+          <a:fontRef idx="minor">
+            <a:schemeClr val="tx1"/>
+          </a:fontRef>
+        </p:style>
+        <p:txBody>
+          <a:bodyPr rtlCol="0" anchor="ctr"/>
+          <a:lstStyle/>
+          <a:p>
+            <a:pPr algn="ctr"/>
+            <a:endParaRPr lang="en-US"/>
+          </a:p>
+        </p:txBody>
+      </p:sp>
+      <p:sp>
+        <p:nvSpPr>
+          <p:cNvPr id="12" name="TextBox 11"/>
+          <p:cNvSpPr txBox="1"/>
+          <p:nvPr/>
+        </p:nvSpPr>
+        <p:spPr>
+          <a:xfrm>
+            <a:off x="1030147" y="6204030"/>
+            <a:ext cx="4533371" cy="369332"/>
+          </a:xfrm>
+          <a:prstGeom prst="rect">
+            <a:avLst/>
+          </a:prstGeom>
+          <a:noFill/>
+        </p:spPr>
+        <p:txBody>
+          <a:bodyPr wrap="square" rtlCol="0">
+            <a:spAutoFit/>
+          </a:bodyPr>
+          <a:lstStyle/>
+          <a:p>
+            <a:r>
+              <a:rPr lang="en-US" dirty="0" smtClean="0"/>
+              <a:t>Note: The red dot does not signify anything</a:t>
+            </a:r>
+            <a:endParaRPr lang="en-US" dirty="0"/>
+          </a:p>
+        </p:txBody>
+      </p:sp>
+    </p:spTree>
+    <p:extLst>
+      <p:ext uri="{BB962C8B-B14F-4D97-AF65-F5344CB8AC3E}">
+        <p14:creationId xmlns:p14="http://schemas.microsoft.com/office/powerpoint/2010/main" val="2268342867"/>
+      </p:ext>
+    </p:extLst>
+  </p:cSld>
+  <p:clrMapOvr>
+    <a:masterClrMapping/>
+  </p:clrMapOvr>
+</p:sld>
+</file>
+
+<file path=ppt/slides/slide7.xml><?xml version="1.0" encoding="utf-8"?>
+<p:sld xmlns:a="http://schemas.openxmlformats.org/drawingml/2006/main" xmlns:r="http://schemas.openxmlformats.org/officeDocument/2006/relationships" xmlns:p="http://schemas.openxmlformats.org/presentationml/2006/main">
+  <p:cSld>
+    <p:spTree>
+      <p:nvGrpSpPr>
+        <p:cNvPr id="1" name=""/>
+        <p:cNvGrpSpPr/>
+        <p:nvPr/>
+      </p:nvGrpSpPr>
+      <p:grpSpPr>
+        <a:xfrm>
+          <a:off x="0" y="0"/>
+          <a:ext cx="0" cy="0"/>
+          <a:chOff x="0" y="0"/>
+          <a:chExt cx="0" cy="0"/>
+        </a:xfrm>
+      </p:grpSpPr>
+    </p:spTree>
+    <p:extLst>
+      <p:ext uri="{BB962C8B-B14F-4D97-AF65-F5344CB8AC3E}">
+        <p14:creationId xmlns:p14="http://schemas.microsoft.com/office/powerpoint/2010/main" val="3319050257"/>
       </p:ext>
     </p:extLst>
   </p:cSld>

</xml_diff>